<commit_message>
Question sets, book of wisdom 1, enemy database
</commit_message>
<xml_diff>
--- a/Konsep.pptx
+++ b/Konsep.pptx
@@ -47,6 +47,7 @@
     <p:sldId id="293" r:id="rId41"/>
     <p:sldId id="294" r:id="rId42"/>
     <p:sldId id="295" r:id="rId43"/>
+    <p:sldId id="302" r:id="rId44"/>
   </p:sldIdLst>
   <p:sldSz cx="12192000" cy="6858000"/>
   <p:notesSz cx="6858000" cy="9144000"/>
@@ -6421,7 +6422,32 @@
           <a:bodyPr/>
           <a:lstStyle/>
           <a:p>
-            <a:endParaRPr lang="en-GB"/>
+            <a:r>
+              <a:rPr lang="en-US" dirty="0"/>
+              <a:t>What is the synonym of big? (enormous, little, tiny, bug)</a:t>
+            </a:r>
+          </a:p>
+          <a:p>
+            <a:r>
+              <a:rPr lang="en-US" dirty="0"/>
+              <a:t>What is the antonym of large? (huge, good, ugly, small)</a:t>
+            </a:r>
+          </a:p>
+          <a:p>
+            <a:r>
+              <a:rPr lang="en-US" dirty="0"/>
+              <a:t>Which has the opposite meaning of mini? (minty, big, bug, small)</a:t>
+            </a:r>
+          </a:p>
+          <a:p>
+            <a:r>
+              <a:rPr lang="en-US" dirty="0"/>
+              <a:t>Which of these doesn’t share the same meaning as enormous? (small, large, big, huge)</a:t>
+            </a:r>
+            <a:endParaRPr lang="en-GB" dirty="0"/>
+          </a:p>
+          <a:p>
+            <a:endParaRPr lang="en-GB" dirty="0"/>
           </a:p>
         </p:txBody>
       </p:sp>
@@ -6517,7 +6543,29 @@
           <a:bodyPr/>
           <a:lstStyle/>
           <a:p>
-            <a:endParaRPr lang="en-GB"/>
+            <a:r>
+              <a:rPr lang="en-US" dirty="0"/>
+              <a:t>What is the synonym of fine? (find, good, gut, money)</a:t>
+            </a:r>
+          </a:p>
+          <a:p>
+            <a:r>
+              <a:rPr lang="en-US" dirty="0"/>
+              <a:t>What is the antonym of acceptable? (chair, satisfactory, bad, pool)</a:t>
+            </a:r>
+          </a:p>
+          <a:p>
+            <a:r>
+              <a:rPr lang="en-US" dirty="0"/>
+              <a:t>Which has the opposite meaning of awful? (satisfactory, lawful, empty, unacceptable)</a:t>
+            </a:r>
+          </a:p>
+          <a:p>
+            <a:r>
+              <a:rPr lang="en-US" dirty="0"/>
+              <a:t>Which of these doesn’t share the same meaning as bad? (poor, inferior, holy, awful)</a:t>
+            </a:r>
+            <a:endParaRPr lang="en-GB" dirty="0"/>
           </a:p>
         </p:txBody>
       </p:sp>
@@ -6613,7 +6661,37 @@
           <a:bodyPr/>
           <a:lstStyle/>
           <a:p>
-            <a:endParaRPr lang="en-GB"/>
+            <a:r>
+              <a:rPr lang="en-US" dirty="0"/>
+              <a:t>Which of these are synonyms? (Happy and Sad, Fine and Good, Enormous and Little, Pretty and Ugly)</a:t>
+            </a:r>
+          </a:p>
+          <a:p>
+            <a:r>
+              <a:rPr lang="en-US" dirty="0"/>
+              <a:t>Which of these are antonyms? (Joyful and Dejected, Acceptable and Fine, Small and Little, Pretty and Attractive)</a:t>
+            </a:r>
+          </a:p>
+          <a:p>
+            <a:r>
+              <a:rPr lang="en-US" dirty="0"/>
+              <a:t>Which of these share the same meaning? (Good and Bad, Fine and Good, Enormous and Little, Pretty and Ugly)</a:t>
+            </a:r>
+          </a:p>
+          <a:p>
+            <a:r>
+              <a:rPr lang="en-US" dirty="0"/>
+              <a:t>Which of these are opposites? (Happy and Merry, Fine and Good, Enormous and Little, Ugly and Hideous)</a:t>
+            </a:r>
+          </a:p>
+          <a:p>
+            <a:endParaRPr lang="en-US" dirty="0"/>
+          </a:p>
+          <a:p>
+            <a:endParaRPr lang="en-US" dirty="0"/>
+          </a:p>
+          <a:p>
+            <a:endParaRPr lang="en-GB" dirty="0"/>
           </a:p>
         </p:txBody>
       </p:sp>
@@ -6699,7 +6777,7 @@
           <a:p>
             <a:r>
               <a:rPr lang="en-US" dirty="0"/>
-              <a:t>Literal means true to the fact, or not exaggerated, or actual, or factual</a:t>
+              <a:t>Literal means true to the meaning of the word, not indicating any metaphor or other meaning</a:t>
             </a:r>
             <a:endParaRPr lang="en-GB" dirty="0"/>
           </a:p>
@@ -7063,7 +7141,25 @@
           <a:p>
             <a:r>
               <a:rPr lang="en-US" dirty="0"/>
-              <a:t>What is the synonym of </a:t>
+              <a:t>____ means true to the meaning of the word. (Literal, Opinion, Writing, Decipherable)</a:t>
+            </a:r>
+          </a:p>
+          <a:p>
+            <a:r>
+              <a:rPr lang="en-US" dirty="0"/>
+              <a:t>____ means not using metaphor. (Opinion, Factual, Imagination, Obnoxious)</a:t>
+            </a:r>
+          </a:p>
+          <a:p>
+            <a:r>
+              <a:rPr lang="en-US" dirty="0"/>
+              <a:t>Not exaggerated describes ____. (Literal, Opinion, Imagination, Therefore)</a:t>
+            </a:r>
+          </a:p>
+          <a:p>
+            <a:r>
+              <a:rPr lang="en-US" dirty="0"/>
+              <a:t>True  to the meaning of the word is the meaning of ____. (Condescending, Imagination, Obnoxious, Literal)</a:t>
             </a:r>
             <a:endParaRPr lang="en-GB" dirty="0"/>
           </a:p>
@@ -7161,7 +7257,29 @@
           <a:bodyPr/>
           <a:lstStyle/>
           <a:p>
-            <a:endParaRPr lang="en-GB"/>
+            <a:r>
+              <a:rPr lang="en-US" dirty="0"/>
+              <a:t>____ means extremely unpleasant. (Obnoxious, Joyful, Big, Small)</a:t>
+            </a:r>
+          </a:p>
+          <a:p>
+            <a:r>
+              <a:rPr lang="en-US" dirty="0"/>
+              <a:t>Extremely unpleasant is replaceable by ____. (Condescending, Literal, Obnoxious, Adjacent)</a:t>
+            </a:r>
+          </a:p>
+          <a:p>
+            <a:r>
+              <a:rPr lang="en-US" dirty="0"/>
+              <a:t>He is obnoxious. It means that person is extremely ____. (Pleasant, Unpleasant, Good, Happy)</a:t>
+            </a:r>
+          </a:p>
+          <a:p>
+            <a:r>
+              <a:rPr lang="en-US" dirty="0"/>
+              <a:t>____ has the opposite meaning of extremely pleasant. (Obnoxious, Nice, Fine, Literal)</a:t>
+            </a:r>
+            <a:endParaRPr lang="en-GB" dirty="0"/>
           </a:p>
         </p:txBody>
       </p:sp>
@@ -8696,7 +8814,32 @@
           <a:bodyPr/>
           <a:lstStyle/>
           <a:p>
-            <a:endParaRPr lang="en-GB"/>
+            <a:r>
+              <a:rPr lang="en-US" dirty="0"/>
+              <a:t>Condescending is having a feeling of patronizing ____. (Superiority, Inferiority, Superficial, Obnoxious)</a:t>
+            </a:r>
+          </a:p>
+          <a:p>
+            <a:r>
+              <a:rPr lang="en-US" dirty="0"/>
+              <a:t>Having or showing a feeling of patronizing superiority is the meaning of ____. (Obnoxious, Literal, Happy, Condescending)</a:t>
+            </a:r>
+          </a:p>
+          <a:p>
+            <a:r>
+              <a:rPr lang="en-US" dirty="0"/>
+              <a:t>To simplify it, having a feeling of patronizing superiority can be rewritten as ____. (Approximate, Condescending, Inferior, Literal)</a:t>
+            </a:r>
+          </a:p>
+          <a:p>
+            <a:r>
+              <a:rPr lang="en-US" dirty="0"/>
+              <a:t>My boss shows a feeling of patronizing superiority. It means that he is ____. (Condescending, Obnoxious, Enormous, Adolescence)</a:t>
+            </a:r>
+            <a:endParaRPr lang="en-GB" dirty="0"/>
+          </a:p>
+          <a:p>
+            <a:endParaRPr lang="en-GB" dirty="0"/>
           </a:p>
         </p:txBody>
       </p:sp>
@@ -8789,10 +8932,34 @@
         </p:nvSpPr>
         <p:spPr/>
         <p:txBody>
-          <a:bodyPr/>
-          <a:lstStyle/>
-          <a:p>
-            <a:endParaRPr lang="en-GB"/>
+          <a:bodyPr>
+            <a:normAutofit/>
+          </a:bodyPr>
+          <a:lstStyle/>
+          <a:p>
+            <a:r>
+              <a:rPr lang="en-US" dirty="0"/>
+              <a:t>Close to the actual thing yet not the exact same thing is an ____ of the thing. (Approximation, Adolescent, Inferior, Unhappy).</a:t>
+            </a:r>
+          </a:p>
+          <a:p>
+            <a:r>
+              <a:rPr lang="en-US" dirty="0"/>
+              <a:t>We cannot get the exact data, so we use an ____ for the calculation. (Approximation, Obnoxious, Adolescent, Literal)</a:t>
+            </a:r>
+          </a:p>
+          <a:p>
+            <a:r>
+              <a:rPr lang="en-US" dirty="0"/>
+              <a:t>Close to the actual, yet not completely exact is rewritable as an ____. (Adoration, Adolescent, Approximation, Unification)</a:t>
+            </a:r>
+          </a:p>
+          <a:p>
+            <a:r>
+              <a:rPr lang="en-US" dirty="0"/>
+              <a:t>An approximation is a good approach to process something that we can’t get the complete ___ of due to limitations. (Exact, Patronize,  Adolescent, Obnoxious)</a:t>
+            </a:r>
+            <a:endParaRPr lang="en-GB" dirty="0"/>
           </a:p>
         </p:txBody>
       </p:sp>
@@ -8888,7 +9055,31 @@
           <a:bodyPr/>
           <a:lstStyle/>
           <a:p>
-            <a:endParaRPr lang="en-GB"/>
+            <a:r>
+              <a:rPr lang="en-US" dirty="0"/>
+              <a:t>He is not pretty and not ____. (Obnoxious, Approximation, Book, But)</a:t>
+            </a:r>
+          </a:p>
+          <a:p>
+            <a:r>
+              <a:rPr lang="en-US" dirty="0"/>
+              <a:t>Sometimes an ____ is better than the exact thing due to resource limitations. (Obnoxious, Condescending, Approximation, Literal)</a:t>
+            </a:r>
+          </a:p>
+          <a:p>
+            <a:r>
+              <a:rPr lang="en-US" dirty="0"/>
+              <a:t>Sometimes people speak using metaphors, so don’t always take their words ____. Observing the situation helps to understand whether they use the actual meaning or metaphor. (Literally, Obnoxious, Approximation, Condescending)</a:t>
+            </a:r>
+          </a:p>
+          <a:p>
+            <a:r>
+              <a:rPr lang="en-US" dirty="0"/>
+              <a:t>I don’t like her. She is pretty but ____. (Obnoxious, Condescending, Approximation, Attractive)</a:t>
+            </a:r>
+          </a:p>
+          <a:p>
+            <a:endParaRPr lang="en-GB" dirty="0"/>
           </a:p>
         </p:txBody>
       </p:sp>
@@ -8896,6 +9087,127 @@
     <p:extLst>
       <p:ext uri="{BB962C8B-B14F-4D97-AF65-F5344CB8AC3E}">
         <p14:creationId xmlns:p14="http://schemas.microsoft.com/office/powerpoint/2010/main" val="2696368741"/>
+      </p:ext>
+    </p:extLst>
+  </p:cSld>
+  <p:clrMapOvr>
+    <a:masterClrMapping/>
+  </p:clrMapOvr>
+</p:sld>
+</file>
+
+<file path=ppt/slides/slide43.xml><?xml version="1.0" encoding="utf-8"?>
+<p:sld xmlns:a="http://schemas.openxmlformats.org/drawingml/2006/main" xmlns:r="http://schemas.openxmlformats.org/officeDocument/2006/relationships" xmlns:p="http://schemas.openxmlformats.org/presentationml/2006/main">
+  <p:cSld>
+    <p:spTree>
+      <p:nvGrpSpPr>
+        <p:cNvPr id="1" name=""/>
+        <p:cNvGrpSpPr/>
+        <p:nvPr/>
+      </p:nvGrpSpPr>
+      <p:grpSpPr>
+        <a:xfrm>
+          <a:off x="0" y="0"/>
+          <a:ext cx="0" cy="0"/>
+          <a:chOff x="0" y="0"/>
+          <a:chExt cx="0" cy="0"/>
+        </a:xfrm>
+      </p:grpSpPr>
+      <p:sp>
+        <p:nvSpPr>
+          <p:cNvPr id="2" name="Title 1">
+            <a:extLst>
+              <a:ext uri="{FF2B5EF4-FFF2-40B4-BE49-F238E27FC236}">
+                <a16:creationId xmlns:a16="http://schemas.microsoft.com/office/drawing/2014/main" id="{7D936542-EF20-4795-BC2F-C90E5FEBA388}"/>
+              </a:ext>
+            </a:extLst>
+          </p:cNvPr>
+          <p:cNvSpPr>
+            <a:spLocks noGrp="1"/>
+          </p:cNvSpPr>
+          <p:nvPr>
+            <p:ph type="title"/>
+          </p:nvPr>
+        </p:nvSpPr>
+        <p:spPr/>
+        <p:txBody>
+          <a:bodyPr/>
+          <a:lstStyle/>
+          <a:p>
+            <a:endParaRPr lang="en-GB"/>
+          </a:p>
+        </p:txBody>
+      </p:sp>
+      <p:sp>
+        <p:nvSpPr>
+          <p:cNvPr id="3" name="Content Placeholder 2">
+            <a:extLst>
+              <a:ext uri="{FF2B5EF4-FFF2-40B4-BE49-F238E27FC236}">
+                <a16:creationId xmlns:a16="http://schemas.microsoft.com/office/drawing/2014/main" id="{DCEB926C-E91A-44C3-B3A8-717024636853}"/>
+              </a:ext>
+            </a:extLst>
+          </p:cNvPr>
+          <p:cNvSpPr>
+            <a:spLocks noGrp="1"/>
+          </p:cNvSpPr>
+          <p:nvPr>
+            <p:ph idx="1"/>
+          </p:nvPr>
+        </p:nvSpPr>
+        <p:spPr/>
+        <p:txBody>
+          <a:bodyPr/>
+          <a:lstStyle/>
+          <a:p>
+            <a:endParaRPr lang="en-GB"/>
+          </a:p>
+        </p:txBody>
+      </p:sp>
+      <p:pic>
+        <p:nvPicPr>
+          <p:cNvPr id="4" name="Picture 3">
+            <a:extLst>
+              <a:ext uri="{FF2B5EF4-FFF2-40B4-BE49-F238E27FC236}">
+                <a16:creationId xmlns:a16="http://schemas.microsoft.com/office/drawing/2014/main" id="{E2285D2B-F91C-47DA-A147-84756EB95CD3}"/>
+              </a:ext>
+            </a:extLst>
+          </p:cNvPr>
+          <p:cNvPicPr>
+            <a:picLocks noChangeAspect="1"/>
+          </p:cNvPicPr>
+          <p:nvPr/>
+        </p:nvPicPr>
+        <p:blipFill>
+          <a:blip r:embed="rId2">
+            <a:clrChange>
+              <a:clrFrom>
+                <a:srgbClr val="FFFFFF"/>
+              </a:clrFrom>
+              <a:clrTo>
+                <a:srgbClr val="FFFFFF">
+                  <a:alpha val="0"/>
+                </a:srgbClr>
+              </a:clrTo>
+            </a:clrChange>
+          </a:blip>
+          <a:stretch>
+            <a:fillRect/>
+          </a:stretch>
+        </p:blipFill>
+        <p:spPr>
+          <a:xfrm>
+            <a:off x="2667000" y="0"/>
+            <a:ext cx="6858000" cy="6858000"/>
+          </a:xfrm>
+          <a:prstGeom prst="rect">
+            <a:avLst/>
+          </a:prstGeom>
+        </p:spPr>
+      </p:pic>
+    </p:spTree>
+    <p:extLst>
+      <p:ext uri="{BB962C8B-B14F-4D97-AF65-F5344CB8AC3E}">
+        <p14:creationId xmlns:p14="http://schemas.microsoft.com/office/powerpoint/2010/main" val="3156047818"/>
       </p:ext>
     </p:extLst>
   </p:cSld>

</xml_diff>

<commit_message>
Book of wisdom 4
</commit_message>
<xml_diff>
--- a/Konsep.pptx
+++ b/Konsep.pptx
@@ -24,30 +24,32 @@
     <p:sldId id="272" r:id="rId18"/>
     <p:sldId id="273" r:id="rId19"/>
     <p:sldId id="274" r:id="rId20"/>
-    <p:sldId id="275" r:id="rId21"/>
-    <p:sldId id="276" r:id="rId22"/>
-    <p:sldId id="277" r:id="rId23"/>
-    <p:sldId id="296" r:id="rId24"/>
-    <p:sldId id="297" r:id="rId25"/>
-    <p:sldId id="278" r:id="rId26"/>
-    <p:sldId id="279" r:id="rId27"/>
-    <p:sldId id="280" r:id="rId28"/>
-    <p:sldId id="281" r:id="rId29"/>
-    <p:sldId id="286" r:id="rId30"/>
-    <p:sldId id="298" r:id="rId31"/>
-    <p:sldId id="299" r:id="rId32"/>
-    <p:sldId id="300" r:id="rId33"/>
-    <p:sldId id="301" r:id="rId34"/>
-    <p:sldId id="282" r:id="rId35"/>
-    <p:sldId id="283" r:id="rId36"/>
-    <p:sldId id="284" r:id="rId37"/>
-    <p:sldId id="285" r:id="rId38"/>
-    <p:sldId id="291" r:id="rId39"/>
-    <p:sldId id="292" r:id="rId40"/>
-    <p:sldId id="293" r:id="rId41"/>
-    <p:sldId id="294" r:id="rId42"/>
-    <p:sldId id="295" r:id="rId43"/>
-    <p:sldId id="302" r:id="rId44"/>
+    <p:sldId id="304" r:id="rId21"/>
+    <p:sldId id="275" r:id="rId22"/>
+    <p:sldId id="276" r:id="rId23"/>
+    <p:sldId id="277" r:id="rId24"/>
+    <p:sldId id="303" r:id="rId25"/>
+    <p:sldId id="296" r:id="rId26"/>
+    <p:sldId id="297" r:id="rId27"/>
+    <p:sldId id="278" r:id="rId28"/>
+    <p:sldId id="279" r:id="rId29"/>
+    <p:sldId id="280" r:id="rId30"/>
+    <p:sldId id="281" r:id="rId31"/>
+    <p:sldId id="286" r:id="rId32"/>
+    <p:sldId id="298" r:id="rId33"/>
+    <p:sldId id="299" r:id="rId34"/>
+    <p:sldId id="300" r:id="rId35"/>
+    <p:sldId id="301" r:id="rId36"/>
+    <p:sldId id="282" r:id="rId37"/>
+    <p:sldId id="283" r:id="rId38"/>
+    <p:sldId id="284" r:id="rId39"/>
+    <p:sldId id="285" r:id="rId40"/>
+    <p:sldId id="291" r:id="rId41"/>
+    <p:sldId id="292" r:id="rId42"/>
+    <p:sldId id="293" r:id="rId43"/>
+    <p:sldId id="294" r:id="rId44"/>
+    <p:sldId id="295" r:id="rId45"/>
+    <p:sldId id="302" r:id="rId46"/>
   </p:sldIdLst>
   <p:sldSz cx="12192000" cy="6858000"/>
   <p:notesSz cx="6858000" cy="9144000"/>
@@ -303,7 +305,7 @@
           <a:p>
             <a:fld id="{95A79124-1DA9-46C5-86F3-281212AEBAAC}" type="datetimeFigureOut">
               <a:rPr lang="en-GB" smtClean="0"/>
-              <a:t>16/05/2020</a:t>
+              <a:t>17/05/2020</a:t>
             </a:fld>
             <a:endParaRPr lang="en-GB"/>
           </a:p>
@@ -503,7 +505,7 @@
           <a:p>
             <a:fld id="{95A79124-1DA9-46C5-86F3-281212AEBAAC}" type="datetimeFigureOut">
               <a:rPr lang="en-GB" smtClean="0"/>
-              <a:t>16/05/2020</a:t>
+              <a:t>17/05/2020</a:t>
             </a:fld>
             <a:endParaRPr lang="en-GB"/>
           </a:p>
@@ -713,7 +715,7 @@
           <a:p>
             <a:fld id="{95A79124-1DA9-46C5-86F3-281212AEBAAC}" type="datetimeFigureOut">
               <a:rPr lang="en-GB" smtClean="0"/>
-              <a:t>16/05/2020</a:t>
+              <a:t>17/05/2020</a:t>
             </a:fld>
             <a:endParaRPr lang="en-GB"/>
           </a:p>
@@ -913,7 +915,7 @@
           <a:p>
             <a:fld id="{95A79124-1DA9-46C5-86F3-281212AEBAAC}" type="datetimeFigureOut">
               <a:rPr lang="en-GB" smtClean="0"/>
-              <a:t>16/05/2020</a:t>
+              <a:t>17/05/2020</a:t>
             </a:fld>
             <a:endParaRPr lang="en-GB"/>
           </a:p>
@@ -1189,7 +1191,7 @@
           <a:p>
             <a:fld id="{95A79124-1DA9-46C5-86F3-281212AEBAAC}" type="datetimeFigureOut">
               <a:rPr lang="en-GB" smtClean="0"/>
-              <a:t>16/05/2020</a:t>
+              <a:t>17/05/2020</a:t>
             </a:fld>
             <a:endParaRPr lang="en-GB"/>
           </a:p>
@@ -1457,7 +1459,7 @@
           <a:p>
             <a:fld id="{95A79124-1DA9-46C5-86F3-281212AEBAAC}" type="datetimeFigureOut">
               <a:rPr lang="en-GB" smtClean="0"/>
-              <a:t>16/05/2020</a:t>
+              <a:t>17/05/2020</a:t>
             </a:fld>
             <a:endParaRPr lang="en-GB"/>
           </a:p>
@@ -1872,7 +1874,7 @@
           <a:p>
             <a:fld id="{95A79124-1DA9-46C5-86F3-281212AEBAAC}" type="datetimeFigureOut">
               <a:rPr lang="en-GB" smtClean="0"/>
-              <a:t>16/05/2020</a:t>
+              <a:t>17/05/2020</a:t>
             </a:fld>
             <a:endParaRPr lang="en-GB"/>
           </a:p>
@@ -2014,7 +2016,7 @@
           <a:p>
             <a:fld id="{95A79124-1DA9-46C5-86F3-281212AEBAAC}" type="datetimeFigureOut">
               <a:rPr lang="en-GB" smtClean="0"/>
-              <a:t>16/05/2020</a:t>
+              <a:t>17/05/2020</a:t>
             </a:fld>
             <a:endParaRPr lang="en-GB"/>
           </a:p>
@@ -2127,7 +2129,7 @@
           <a:p>
             <a:fld id="{95A79124-1DA9-46C5-86F3-281212AEBAAC}" type="datetimeFigureOut">
               <a:rPr lang="en-GB" smtClean="0"/>
-              <a:t>16/05/2020</a:t>
+              <a:t>17/05/2020</a:t>
             </a:fld>
             <a:endParaRPr lang="en-GB"/>
           </a:p>
@@ -2440,7 +2442,7 @@
           <a:p>
             <a:fld id="{95A79124-1DA9-46C5-86F3-281212AEBAAC}" type="datetimeFigureOut">
               <a:rPr lang="en-GB" smtClean="0"/>
-              <a:t>16/05/2020</a:t>
+              <a:t>17/05/2020</a:t>
             </a:fld>
             <a:endParaRPr lang="en-GB"/>
           </a:p>
@@ -2729,7 +2731,7 @@
           <a:p>
             <a:fld id="{95A79124-1DA9-46C5-86F3-281212AEBAAC}" type="datetimeFigureOut">
               <a:rPr lang="en-GB" smtClean="0"/>
-              <a:t>16/05/2020</a:t>
+              <a:t>17/05/2020</a:t>
             </a:fld>
             <a:endParaRPr lang="en-GB"/>
           </a:p>
@@ -2972,7 +2974,7 @@
           <a:p>
             <a:fld id="{95A79124-1DA9-46C5-86F3-281212AEBAAC}" type="datetimeFigureOut">
               <a:rPr lang="en-GB" smtClean="0"/>
-              <a:t>16/05/2020</a:t>
+              <a:t>17/05/2020</a:t>
             </a:fld>
             <a:endParaRPr lang="en-GB"/>
           </a:p>
@@ -5064,7 +5066,7 @@
           <p:cNvPr id="2" name="Title 1">
             <a:extLst>
               <a:ext uri="{FF2B5EF4-FFF2-40B4-BE49-F238E27FC236}">
-                <a16:creationId xmlns:a16="http://schemas.microsoft.com/office/drawing/2014/main" id="{0418B27E-6E77-4C18-A2A5-5B5B42EFABFA}"/>
+                <a16:creationId xmlns:a16="http://schemas.microsoft.com/office/drawing/2014/main" id="{ECE75923-8527-4A92-9FB9-21311A8C62DF}"/>
               </a:ext>
             </a:extLst>
           </p:cNvPr>
@@ -5082,7 +5084,7 @@
           <a:p>
             <a:r>
               <a:rPr lang="en-US" dirty="0"/>
-              <a:t>Book of wisdom 4, </a:t>
+              <a:t>Book of wisdom 2, </a:t>
             </a:r>
             <a:r>
               <a:rPr lang="en-US" dirty="0" err="1"/>
@@ -5090,7 +5092,7 @@
             </a:r>
             <a:r>
               <a:rPr lang="en-US" dirty="0"/>
-              <a:t> 1</a:t>
+              <a:t> 4</a:t>
             </a:r>
             <a:endParaRPr lang="en-GB" dirty="0"/>
           </a:p>
@@ -5101,7 +5103,7 @@
           <p:cNvPr id="3" name="Content Placeholder 2">
             <a:extLst>
               <a:ext uri="{FF2B5EF4-FFF2-40B4-BE49-F238E27FC236}">
-                <a16:creationId xmlns:a16="http://schemas.microsoft.com/office/drawing/2014/main" id="{04352660-CA9F-42BD-9D15-6967DE6A6386}"/>
+                <a16:creationId xmlns:a16="http://schemas.microsoft.com/office/drawing/2014/main" id="{87CC6091-6FCA-441D-AD88-C1C467899740}"/>
               </a:ext>
             </a:extLst>
           </p:cNvPr>
@@ -5119,19 +5121,27 @@
           <a:p>
             <a:r>
               <a:rPr lang="en-US" dirty="0"/>
-              <a:t>He is ___ basketball. (play, playing, read, reading)</a:t>
-            </a:r>
-          </a:p>
-          <a:p>
-            <a:r>
-              <a:rPr lang="en-US" dirty="0"/>
-              <a:t>He ___ TV. (sleep, watch, sleeps, watches)</a:t>
-            </a:r>
-          </a:p>
-          <a:p>
-            <a:r>
-              <a:rPr lang="en-US" dirty="0"/>
-              <a:t>The plane is _____. (fly, landing, airport, wing)</a:t>
+              <a:t>This is ___ pencil</a:t>
+            </a:r>
+            <a:r>
+              <a:rPr lang="en-US"/>
+              <a:t>. (</a:t>
+            </a:r>
+            <a:r>
+              <a:rPr lang="en-US" dirty="0"/>
+              <a:t>you, your, you’re, are)</a:t>
+            </a:r>
+          </a:p>
+          <a:p>
+            <a:r>
+              <a:rPr lang="en-US" dirty="0"/>
+              <a:t>____ are smart. </a:t>
+            </a:r>
+          </a:p>
+          <a:p>
+            <a:r>
+              <a:rPr lang="en-US" dirty="0"/>
+              <a:t>I am in front of ___.  </a:t>
             </a:r>
             <a:endParaRPr lang="en-GB" dirty="0"/>
           </a:p>
@@ -5140,7 +5150,7 @@
     </p:spTree>
     <p:extLst>
       <p:ext uri="{BB962C8B-B14F-4D97-AF65-F5344CB8AC3E}">
-        <p14:creationId xmlns:p14="http://schemas.microsoft.com/office/powerpoint/2010/main" val="1316261906"/>
+        <p14:creationId xmlns:p14="http://schemas.microsoft.com/office/powerpoint/2010/main" val="1785930289"/>
       </p:ext>
     </p:extLst>
   </p:cSld>
@@ -5198,7 +5208,7 @@
             </a:r>
             <a:r>
               <a:rPr lang="en-US" dirty="0"/>
-              <a:t> 2</a:t>
+              <a:t> 1</a:t>
             </a:r>
             <a:endParaRPr lang="en-GB" dirty="0"/>
           </a:p>
@@ -5227,19 +5237,19 @@
           <a:p>
             <a:r>
               <a:rPr lang="en-US" dirty="0"/>
-              <a:t>May I ____ your pencil to my friend? (lend, lending, borrow, borrowing)</a:t>
-            </a:r>
-          </a:p>
-          <a:p>
-            <a:r>
-              <a:rPr lang="en-US" dirty="0"/>
-              <a:t>What are you ____ ? (read, do, doing, wing)</a:t>
-            </a:r>
-          </a:p>
-          <a:p>
-            <a:r>
-              <a:rPr lang="en-US" dirty="0"/>
-              <a:t>The plane is ____ so high. (flying, land, fly, wing)</a:t>
+              <a:t>He is ___ basketball. (play, playing, read, reading)</a:t>
+            </a:r>
+          </a:p>
+          <a:p>
+            <a:r>
+              <a:rPr lang="en-US" dirty="0"/>
+              <a:t>He ___ TV. (sleep, watch, sleeps, watches)</a:t>
+            </a:r>
+          </a:p>
+          <a:p>
+            <a:r>
+              <a:rPr lang="en-US" dirty="0"/>
+              <a:t>The plane is _____. (fly, landing, airport, wing)</a:t>
             </a:r>
             <a:endParaRPr lang="en-GB" dirty="0"/>
           </a:p>
@@ -5248,7 +5258,7 @@
     </p:spTree>
     <p:extLst>
       <p:ext uri="{BB962C8B-B14F-4D97-AF65-F5344CB8AC3E}">
-        <p14:creationId xmlns:p14="http://schemas.microsoft.com/office/powerpoint/2010/main" val="247587498"/>
+        <p14:creationId xmlns:p14="http://schemas.microsoft.com/office/powerpoint/2010/main" val="1316261906"/>
       </p:ext>
     </p:extLst>
   </p:cSld>
@@ -5306,7 +5316,7 @@
             </a:r>
             <a:r>
               <a:rPr lang="en-US" dirty="0"/>
-              <a:t> 3</a:t>
+              <a:t> 2</a:t>
             </a:r>
             <a:endParaRPr lang="en-GB" dirty="0"/>
           </a:p>
@@ -5335,19 +5345,19 @@
           <a:p>
             <a:r>
               <a:rPr lang="en-US" dirty="0"/>
-              <a:t>Which one is a verb? (play, player, plaything, prey)</a:t>
-            </a:r>
-          </a:p>
-          <a:p>
-            <a:r>
-              <a:rPr lang="en-US" dirty="0"/>
-              <a:t>Which one is an adjective? (bulk, beauty, beautiful, bounty) </a:t>
-            </a:r>
-          </a:p>
-          <a:p>
-            <a:r>
-              <a:rPr lang="en-US" dirty="0"/>
-              <a:t>Which one is a noun? ( acknowledge, acting, accept, actor)</a:t>
+              <a:t>May I ____ your pencil to my friend? (lend, lending, borrow, borrowing)</a:t>
+            </a:r>
+          </a:p>
+          <a:p>
+            <a:r>
+              <a:rPr lang="en-US" dirty="0"/>
+              <a:t>What are you ____ ? (read, do, doing, wing)</a:t>
+            </a:r>
+          </a:p>
+          <a:p>
+            <a:r>
+              <a:rPr lang="en-US" dirty="0"/>
+              <a:t>The plane is ____ so high. (flying, land, fly, wing)</a:t>
             </a:r>
             <a:endParaRPr lang="en-GB" dirty="0"/>
           </a:p>
@@ -5356,7 +5366,7 @@
     </p:spTree>
     <p:extLst>
       <p:ext uri="{BB962C8B-B14F-4D97-AF65-F5344CB8AC3E}">
-        <p14:creationId xmlns:p14="http://schemas.microsoft.com/office/powerpoint/2010/main" val="3418075117"/>
+        <p14:creationId xmlns:p14="http://schemas.microsoft.com/office/powerpoint/2010/main" val="247587498"/>
       </p:ext>
     </p:extLst>
   </p:cSld>
@@ -5388,7 +5398,7 @@
           <p:cNvPr id="2" name="Title 1">
             <a:extLst>
               <a:ext uri="{FF2B5EF4-FFF2-40B4-BE49-F238E27FC236}">
-                <a16:creationId xmlns:a16="http://schemas.microsoft.com/office/drawing/2014/main" id="{BF6D8E63-5769-4708-B966-1033DCC83EDD}"/>
+                <a16:creationId xmlns:a16="http://schemas.microsoft.com/office/drawing/2014/main" id="{0418B27E-6E77-4C18-A2A5-5B5B42EFABFA}"/>
               </a:ext>
             </a:extLst>
           </p:cNvPr>
@@ -5406,7 +5416,7 @@
           <a:p>
             <a:r>
               <a:rPr lang="en-US" dirty="0"/>
-              <a:t>Book of Wisdom 5, </a:t>
+              <a:t>Book of wisdom 4, </a:t>
             </a:r>
             <a:r>
               <a:rPr lang="en-US" dirty="0" err="1"/>
@@ -5414,7 +5424,7 @@
             </a:r>
             <a:r>
               <a:rPr lang="en-US" dirty="0"/>
-              <a:t> 1</a:t>
+              <a:t> 3</a:t>
             </a:r>
             <a:endParaRPr lang="en-GB" dirty="0"/>
           </a:p>
@@ -5425,7 +5435,7 @@
           <p:cNvPr id="3" name="Content Placeholder 2">
             <a:extLst>
               <a:ext uri="{FF2B5EF4-FFF2-40B4-BE49-F238E27FC236}">
-                <a16:creationId xmlns:a16="http://schemas.microsoft.com/office/drawing/2014/main" id="{2AE6A7FA-0292-49BE-8387-70A3B2AF6727}"/>
+                <a16:creationId xmlns:a16="http://schemas.microsoft.com/office/drawing/2014/main" id="{04352660-CA9F-42BD-9D15-6967DE6A6386}"/>
               </a:ext>
             </a:extLst>
           </p:cNvPr>
@@ -5443,27 +5453,19 @@
           <a:p>
             <a:r>
               <a:rPr lang="en-US" dirty="0"/>
-              <a:t>Yesterday, he ___ from school to home. (walk, walked, walking, </a:t>
-            </a:r>
-            <a:r>
-              <a:rPr lang="en-US" dirty="0" err="1"/>
-              <a:t>walken</a:t>
-            </a:r>
-            <a:r>
-              <a:rPr lang="en-US" dirty="0"/>
-              <a:t>)</a:t>
-            </a:r>
-          </a:p>
-          <a:p>
-            <a:r>
-              <a:rPr lang="en-US" dirty="0"/>
-              <a:t>Tomorrow, he will ___ chocolate. (eat, eating, ate, eaten)</a:t>
-            </a:r>
-          </a:p>
-          <a:p>
-            <a:r>
-              <a:rPr lang="en-US" dirty="0"/>
-              <a:t>It is time for Bob to leave. He has ____ everything (see, seeing, saw, seen)</a:t>
+              <a:t>Which one is a verb? (play, player, plaything, prey)</a:t>
+            </a:r>
+          </a:p>
+          <a:p>
+            <a:r>
+              <a:rPr lang="en-US" dirty="0"/>
+              <a:t>Which one is an adjective? (bulk, beauty, beautiful, bounty) </a:t>
+            </a:r>
+          </a:p>
+          <a:p>
+            <a:r>
+              <a:rPr lang="en-US" dirty="0"/>
+              <a:t>Which one is a noun? ( acknowledge, acting, accept, actor)</a:t>
             </a:r>
             <a:endParaRPr lang="en-GB" dirty="0"/>
           </a:p>
@@ -5472,7 +5474,7 @@
     </p:spTree>
     <p:extLst>
       <p:ext uri="{BB962C8B-B14F-4D97-AF65-F5344CB8AC3E}">
-        <p14:creationId xmlns:p14="http://schemas.microsoft.com/office/powerpoint/2010/main" val="2658664680"/>
+        <p14:creationId xmlns:p14="http://schemas.microsoft.com/office/powerpoint/2010/main" val="3418075117"/>
       </p:ext>
     </p:extLst>
   </p:cSld>
@@ -5504,7 +5506,7 @@
           <p:cNvPr id="2" name="Title 1">
             <a:extLst>
               <a:ext uri="{FF2B5EF4-FFF2-40B4-BE49-F238E27FC236}">
-                <a16:creationId xmlns:a16="http://schemas.microsoft.com/office/drawing/2014/main" id="{82D68E27-29C4-4B66-858C-788CB77F47ED}"/>
+                <a16:creationId xmlns:a16="http://schemas.microsoft.com/office/drawing/2014/main" id="{0418B27E-6E77-4C18-A2A5-5B5B42EFABFA}"/>
               </a:ext>
             </a:extLst>
           </p:cNvPr>
@@ -5522,7 +5524,7 @@
           <a:p>
             <a:r>
               <a:rPr lang="en-US" dirty="0"/>
-              <a:t>Book of Wisdom 5, </a:t>
+              <a:t>Book of wisdom 4, </a:t>
             </a:r>
             <a:r>
               <a:rPr lang="en-US" dirty="0" err="1"/>
@@ -5530,7 +5532,7 @@
             </a:r>
             <a:r>
               <a:rPr lang="en-US" dirty="0"/>
-              <a:t> 2</a:t>
+              <a:t> 4</a:t>
             </a:r>
             <a:endParaRPr lang="en-GB" dirty="0"/>
           </a:p>
@@ -5541,7 +5543,7 @@
           <p:cNvPr id="3" name="Content Placeholder 2">
             <a:extLst>
               <a:ext uri="{FF2B5EF4-FFF2-40B4-BE49-F238E27FC236}">
-                <a16:creationId xmlns:a16="http://schemas.microsoft.com/office/drawing/2014/main" id="{8CC2B40B-31DA-45F1-8B35-44F2DD1FE44F}"/>
+                <a16:creationId xmlns:a16="http://schemas.microsoft.com/office/drawing/2014/main" id="{04352660-CA9F-42BD-9D15-6967DE6A6386}"/>
               </a:ext>
             </a:extLst>
           </p:cNvPr>
@@ -5559,27 +5561,19 @@
           <a:p>
             <a:r>
               <a:rPr lang="en-US" dirty="0"/>
-              <a:t>Yesterday, I ___ a bike to the mall. (ride, rode, ridden, read)</a:t>
-            </a:r>
-          </a:p>
-          <a:p>
-            <a:r>
-              <a:rPr lang="en-US" dirty="0"/>
-              <a:t>Which of these is a past participle? (ate, read, sang, saw)</a:t>
-            </a:r>
-          </a:p>
-          <a:p>
-            <a:r>
-              <a:rPr lang="en-US" dirty="0"/>
-              <a:t>Which of these is a past tense? (red, read, </a:t>
-            </a:r>
-            <a:r>
-              <a:rPr lang="en-US" dirty="0" err="1"/>
-              <a:t>readed</a:t>
-            </a:r>
-            <a:r>
-              <a:rPr lang="en-US" dirty="0"/>
-              <a:t>, ridden)</a:t>
+              <a:t>Which one is a verb? (open, closed, but, door)</a:t>
+            </a:r>
+          </a:p>
+          <a:p>
+            <a:r>
+              <a:rPr lang="en-US" dirty="0"/>
+              <a:t>Which one is an adjective? </a:t>
+            </a:r>
+          </a:p>
+          <a:p>
+            <a:r>
+              <a:rPr lang="en-US" dirty="0"/>
+              <a:t>Which one is a noun? </a:t>
             </a:r>
             <a:endParaRPr lang="en-GB" dirty="0"/>
           </a:p>
@@ -5588,7 +5582,7 @@
     </p:spTree>
     <p:extLst>
       <p:ext uri="{BB962C8B-B14F-4D97-AF65-F5344CB8AC3E}">
-        <p14:creationId xmlns:p14="http://schemas.microsoft.com/office/powerpoint/2010/main" val="3660648772"/>
+        <p14:creationId xmlns:p14="http://schemas.microsoft.com/office/powerpoint/2010/main" val="1484066853"/>
       </p:ext>
     </p:extLst>
   </p:cSld>
@@ -5620,7 +5614,7 @@
           <p:cNvPr id="2" name="Title 1">
             <a:extLst>
               <a:ext uri="{FF2B5EF4-FFF2-40B4-BE49-F238E27FC236}">
-                <a16:creationId xmlns:a16="http://schemas.microsoft.com/office/drawing/2014/main" id="{719D5F30-8640-4CDA-99C6-86E605FE2395}"/>
+                <a16:creationId xmlns:a16="http://schemas.microsoft.com/office/drawing/2014/main" id="{BF6D8E63-5769-4708-B966-1033DCC83EDD}"/>
               </a:ext>
             </a:extLst>
           </p:cNvPr>
@@ -5638,7 +5632,15 @@
           <a:p>
             <a:r>
               <a:rPr lang="en-US" dirty="0"/>
-              <a:t>Clue 1</a:t>
+              <a:t>Book of Wisdom 5, </a:t>
+            </a:r>
+            <a:r>
+              <a:rPr lang="en-US" dirty="0" err="1"/>
+              <a:t>Qset</a:t>
+            </a:r>
+            <a:r>
+              <a:rPr lang="en-US" dirty="0"/>
+              <a:t> 1</a:t>
             </a:r>
             <a:endParaRPr lang="en-GB" dirty="0"/>
           </a:p>
@@ -5649,7 +5651,7 @@
           <p:cNvPr id="3" name="Content Placeholder 2">
             <a:extLst>
               <a:ext uri="{FF2B5EF4-FFF2-40B4-BE49-F238E27FC236}">
-                <a16:creationId xmlns:a16="http://schemas.microsoft.com/office/drawing/2014/main" id="{CF1E1E75-57F7-417A-89C1-B26E9A8731BD}"/>
+                <a16:creationId xmlns:a16="http://schemas.microsoft.com/office/drawing/2014/main" id="{2AE6A7FA-0292-49BE-8387-70A3B2AF6727}"/>
               </a:ext>
             </a:extLst>
           </p:cNvPr>
@@ -5667,7 +5669,27 @@
           <a:p>
             <a:r>
               <a:rPr lang="en-US" dirty="0"/>
-              <a:t>Happy, merry, joyful, cheerful are the opposites of sad, dejected, down</a:t>
+              <a:t>Yesterday, he ___ from school to home. (walk, walked, walking, </a:t>
+            </a:r>
+            <a:r>
+              <a:rPr lang="en-US" dirty="0" err="1"/>
+              <a:t>walken</a:t>
+            </a:r>
+            <a:r>
+              <a:rPr lang="en-US" dirty="0"/>
+              <a:t>)</a:t>
+            </a:r>
+          </a:p>
+          <a:p>
+            <a:r>
+              <a:rPr lang="en-US" dirty="0"/>
+              <a:t>Tomorrow, he will ___ chocolate. (eat, eating, ate, eaten)</a:t>
+            </a:r>
+          </a:p>
+          <a:p>
+            <a:r>
+              <a:rPr lang="en-US" dirty="0"/>
+              <a:t>It is time for Bob to leave. He has ____ everything (see, seeing, saw, seen)</a:t>
             </a:r>
             <a:endParaRPr lang="en-GB" dirty="0"/>
           </a:p>
@@ -5676,7 +5698,7 @@
     </p:spTree>
     <p:extLst>
       <p:ext uri="{BB962C8B-B14F-4D97-AF65-F5344CB8AC3E}">
-        <p14:creationId xmlns:p14="http://schemas.microsoft.com/office/powerpoint/2010/main" val="570786671"/>
+        <p14:creationId xmlns:p14="http://schemas.microsoft.com/office/powerpoint/2010/main" val="2658664680"/>
       </p:ext>
     </p:extLst>
   </p:cSld>
@@ -5708,7 +5730,7 @@
           <p:cNvPr id="2" name="Title 1">
             <a:extLst>
               <a:ext uri="{FF2B5EF4-FFF2-40B4-BE49-F238E27FC236}">
-                <a16:creationId xmlns:a16="http://schemas.microsoft.com/office/drawing/2014/main" id="{3FA14D1F-14DD-43DD-9506-C5DE5BE5F66E}"/>
+                <a16:creationId xmlns:a16="http://schemas.microsoft.com/office/drawing/2014/main" id="{82D68E27-29C4-4B66-858C-788CB77F47ED}"/>
               </a:ext>
             </a:extLst>
           </p:cNvPr>
@@ -5726,7 +5748,15 @@
           <a:p>
             <a:r>
               <a:rPr lang="en-US" dirty="0"/>
-              <a:t>Clue 2</a:t>
+              <a:t>Book of Wisdom 5, </a:t>
+            </a:r>
+            <a:r>
+              <a:rPr lang="en-US" dirty="0" err="1"/>
+              <a:t>Qset</a:t>
+            </a:r>
+            <a:r>
+              <a:rPr lang="en-US" dirty="0"/>
+              <a:t> 2</a:t>
             </a:r>
             <a:endParaRPr lang="en-GB" dirty="0"/>
           </a:p>
@@ -5737,7 +5767,7 @@
           <p:cNvPr id="3" name="Content Placeholder 2">
             <a:extLst>
               <a:ext uri="{FF2B5EF4-FFF2-40B4-BE49-F238E27FC236}">
-                <a16:creationId xmlns:a16="http://schemas.microsoft.com/office/drawing/2014/main" id="{44553255-9912-4733-A352-45D5D4BC6624}"/>
+                <a16:creationId xmlns:a16="http://schemas.microsoft.com/office/drawing/2014/main" id="{8CC2B40B-31DA-45F1-8B35-44F2DD1FE44F}"/>
               </a:ext>
             </a:extLst>
           </p:cNvPr>
@@ -5755,7 +5785,27 @@
           <a:p>
             <a:r>
               <a:rPr lang="en-US" dirty="0"/>
-              <a:t>Beautiful, pretty, attractive, alluring are the opposites of ugly, hideous, horrible</a:t>
+              <a:t>Yesterday, I ___ a bike to the mall. (ride, rode, ridden, read)</a:t>
+            </a:r>
+          </a:p>
+          <a:p>
+            <a:r>
+              <a:rPr lang="en-US" dirty="0"/>
+              <a:t>Which of these is a past participle? (ate, read, sang, saw)</a:t>
+            </a:r>
+          </a:p>
+          <a:p>
+            <a:r>
+              <a:rPr lang="en-US" dirty="0"/>
+              <a:t>Which of these is a past tense? (red, read, </a:t>
+            </a:r>
+            <a:r>
+              <a:rPr lang="en-US" dirty="0" err="1"/>
+              <a:t>readed</a:t>
+            </a:r>
+            <a:r>
+              <a:rPr lang="en-US" dirty="0"/>
+              <a:t>, ridden)</a:t>
             </a:r>
             <a:endParaRPr lang="en-GB" dirty="0"/>
           </a:p>
@@ -5764,7 +5814,7 @@
     </p:spTree>
     <p:extLst>
       <p:ext uri="{BB962C8B-B14F-4D97-AF65-F5344CB8AC3E}">
-        <p14:creationId xmlns:p14="http://schemas.microsoft.com/office/powerpoint/2010/main" val="1196985934"/>
+        <p14:creationId xmlns:p14="http://schemas.microsoft.com/office/powerpoint/2010/main" val="3660648772"/>
       </p:ext>
     </p:extLst>
   </p:cSld>
@@ -5796,7 +5846,7 @@
           <p:cNvPr id="2" name="Title 1">
             <a:extLst>
               <a:ext uri="{FF2B5EF4-FFF2-40B4-BE49-F238E27FC236}">
-                <a16:creationId xmlns:a16="http://schemas.microsoft.com/office/drawing/2014/main" id="{F5F39A93-165B-40A8-B194-8F75B9A4EA00}"/>
+                <a16:creationId xmlns:a16="http://schemas.microsoft.com/office/drawing/2014/main" id="{719D5F30-8640-4CDA-99C6-86E605FE2395}"/>
               </a:ext>
             </a:extLst>
           </p:cNvPr>
@@ -5814,7 +5864,7 @@
           <a:p>
             <a:r>
               <a:rPr lang="en-US" dirty="0"/>
-              <a:t>Clue 3</a:t>
+              <a:t>Clue 1</a:t>
             </a:r>
             <a:endParaRPr lang="en-GB" dirty="0"/>
           </a:p>
@@ -5825,7 +5875,7 @@
           <p:cNvPr id="3" name="Content Placeholder 2">
             <a:extLst>
               <a:ext uri="{FF2B5EF4-FFF2-40B4-BE49-F238E27FC236}">
-                <a16:creationId xmlns:a16="http://schemas.microsoft.com/office/drawing/2014/main" id="{2284BAB7-E127-4D16-BA68-65C53A37C9AB}"/>
+                <a16:creationId xmlns:a16="http://schemas.microsoft.com/office/drawing/2014/main" id="{CF1E1E75-57F7-417A-89C1-B26E9A8731BD}"/>
               </a:ext>
             </a:extLst>
           </p:cNvPr>
@@ -5843,7 +5893,7 @@
           <a:p>
             <a:r>
               <a:rPr lang="en-US" dirty="0"/>
-              <a:t>Big, large, huge, enormous are the opposites of small, little, tiny, mini</a:t>
+              <a:t>Happy, merry, joyful, cheerful are the opposites of sad, dejected, down</a:t>
             </a:r>
             <a:endParaRPr lang="en-GB" dirty="0"/>
           </a:p>
@@ -5852,7 +5902,7 @@
     </p:spTree>
     <p:extLst>
       <p:ext uri="{BB962C8B-B14F-4D97-AF65-F5344CB8AC3E}">
-        <p14:creationId xmlns:p14="http://schemas.microsoft.com/office/powerpoint/2010/main" val="1134046550"/>
+        <p14:creationId xmlns:p14="http://schemas.microsoft.com/office/powerpoint/2010/main" val="570786671"/>
       </p:ext>
     </p:extLst>
   </p:cSld>
@@ -5884,7 +5934,7 @@
           <p:cNvPr id="2" name="Title 1">
             <a:extLst>
               <a:ext uri="{FF2B5EF4-FFF2-40B4-BE49-F238E27FC236}">
-                <a16:creationId xmlns:a16="http://schemas.microsoft.com/office/drawing/2014/main" id="{F809AF59-F92B-4784-A106-7BB90BCABCD7}"/>
+                <a16:creationId xmlns:a16="http://schemas.microsoft.com/office/drawing/2014/main" id="{3FA14D1F-14DD-43DD-9506-C5DE5BE5F66E}"/>
               </a:ext>
             </a:extLst>
           </p:cNvPr>
@@ -5902,7 +5952,7 @@
           <a:p>
             <a:r>
               <a:rPr lang="en-US" dirty="0"/>
-              <a:t>Clue 4</a:t>
+              <a:t>Clue 2</a:t>
             </a:r>
             <a:endParaRPr lang="en-GB" dirty="0"/>
           </a:p>
@@ -5913,7 +5963,7 @@
           <p:cNvPr id="3" name="Content Placeholder 2">
             <a:extLst>
               <a:ext uri="{FF2B5EF4-FFF2-40B4-BE49-F238E27FC236}">
-                <a16:creationId xmlns:a16="http://schemas.microsoft.com/office/drawing/2014/main" id="{6C9A385F-52AC-4463-BDED-1E9E64DFC5C1}"/>
+                <a16:creationId xmlns:a16="http://schemas.microsoft.com/office/drawing/2014/main" id="{44553255-9912-4733-A352-45D5D4BC6624}"/>
               </a:ext>
             </a:extLst>
           </p:cNvPr>
@@ -5931,7 +5981,7 @@
           <a:p>
             <a:r>
               <a:rPr lang="en-US" dirty="0"/>
-              <a:t>Good, fine, satisfactory, acceptable are the opposites of bad, poor, inferior, awful</a:t>
+              <a:t>Beautiful, pretty, attractive, alluring are the opposites of ugly, hideous, horrible</a:t>
             </a:r>
             <a:endParaRPr lang="en-GB" dirty="0"/>
           </a:p>
@@ -5940,7 +5990,7 @@
     </p:spTree>
     <p:extLst>
       <p:ext uri="{BB962C8B-B14F-4D97-AF65-F5344CB8AC3E}">
-        <p14:creationId xmlns:p14="http://schemas.microsoft.com/office/powerpoint/2010/main" val="3313335390"/>
+        <p14:creationId xmlns:p14="http://schemas.microsoft.com/office/powerpoint/2010/main" val="1196985934"/>
       </p:ext>
     </p:extLst>
   </p:cSld>
@@ -5972,7 +6022,7 @@
           <p:cNvPr id="2" name="Title 1">
             <a:extLst>
               <a:ext uri="{FF2B5EF4-FFF2-40B4-BE49-F238E27FC236}">
-                <a16:creationId xmlns:a16="http://schemas.microsoft.com/office/drawing/2014/main" id="{F143DA0C-6127-4680-881B-473920F2D9BC}"/>
+                <a16:creationId xmlns:a16="http://schemas.microsoft.com/office/drawing/2014/main" id="{F5F39A93-165B-40A8-B194-8F75B9A4EA00}"/>
               </a:ext>
             </a:extLst>
           </p:cNvPr>
@@ -5989,20 +6039,8 @@
           <a:lstStyle/>
           <a:p>
             <a:r>
-              <a:rPr lang="en-US" dirty="0" err="1"/>
-              <a:t>Blesser</a:t>
-            </a:r>
-            <a:r>
-              <a:rPr lang="en-US" dirty="0"/>
-              <a:t> of Wisdom 1, </a:t>
-            </a:r>
-            <a:r>
-              <a:rPr lang="en-US" dirty="0" err="1"/>
-              <a:t>Qset</a:t>
-            </a:r>
-            <a:r>
-              <a:rPr lang="en-US" dirty="0"/>
-              <a:t> 1</a:t>
+              <a:rPr lang="en-US" dirty="0"/>
+              <a:t>Clue 3</a:t>
             </a:r>
             <a:endParaRPr lang="en-GB" dirty="0"/>
           </a:p>
@@ -6013,7 +6051,7 @@
           <p:cNvPr id="3" name="Content Placeholder 2">
             <a:extLst>
               <a:ext uri="{FF2B5EF4-FFF2-40B4-BE49-F238E27FC236}">
-                <a16:creationId xmlns:a16="http://schemas.microsoft.com/office/drawing/2014/main" id="{25A13670-599A-4785-B5B9-C31E0BC5AA90}"/>
+                <a16:creationId xmlns:a16="http://schemas.microsoft.com/office/drawing/2014/main" id="{2284BAB7-E127-4D16-BA68-65C53A37C9AB}"/>
               </a:ext>
             </a:extLst>
           </p:cNvPr>
@@ -6031,25 +6069,7 @@
           <a:p>
             <a:r>
               <a:rPr lang="en-US" dirty="0"/>
-              <a:t>What is the synonym of happy? (high, merry, sad, up)</a:t>
-            </a:r>
-          </a:p>
-          <a:p>
-            <a:r>
-              <a:rPr lang="en-US" dirty="0"/>
-              <a:t>What is the antonym of sad? (dejected, down, joyful, fly)</a:t>
-            </a:r>
-          </a:p>
-          <a:p>
-            <a:r>
-              <a:rPr lang="en-US" dirty="0"/>
-              <a:t>Which has the opposite meaning of joyful? (death, cheerful, sad, indifferent)</a:t>
-            </a:r>
-          </a:p>
-          <a:p>
-            <a:r>
-              <a:rPr lang="en-US" dirty="0"/>
-              <a:t>Which of these doesn’t share the same meaning as merry? (happy, joyful, cheerful, smile)  </a:t>
+              <a:t>Big, large, huge, enormous are the opposites of small, little, tiny, mini</a:t>
             </a:r>
             <a:endParaRPr lang="en-GB" dirty="0"/>
           </a:p>
@@ -6058,7 +6078,7 @@
     </p:spTree>
     <p:extLst>
       <p:ext uri="{BB962C8B-B14F-4D97-AF65-F5344CB8AC3E}">
-        <p14:creationId xmlns:p14="http://schemas.microsoft.com/office/powerpoint/2010/main" val="3143732294"/>
+        <p14:creationId xmlns:p14="http://schemas.microsoft.com/office/powerpoint/2010/main" val="1134046550"/>
       </p:ext>
     </p:extLst>
   </p:cSld>
@@ -6244,7 +6264,7 @@
           <p:cNvPr id="2" name="Title 1">
             <a:extLst>
               <a:ext uri="{FF2B5EF4-FFF2-40B4-BE49-F238E27FC236}">
-                <a16:creationId xmlns:a16="http://schemas.microsoft.com/office/drawing/2014/main" id="{F143DA0C-6127-4680-881B-473920F2D9BC}"/>
+                <a16:creationId xmlns:a16="http://schemas.microsoft.com/office/drawing/2014/main" id="{F809AF59-F92B-4784-A106-7BB90BCABCD7}"/>
               </a:ext>
             </a:extLst>
           </p:cNvPr>
@@ -6261,20 +6281,8 @@
           <a:lstStyle/>
           <a:p>
             <a:r>
-              <a:rPr lang="en-US" dirty="0" err="1"/>
-              <a:t>Blesser</a:t>
-            </a:r>
-            <a:r>
-              <a:rPr lang="en-US" dirty="0"/>
-              <a:t> of Wisdom 1, </a:t>
-            </a:r>
-            <a:r>
-              <a:rPr lang="en-US" dirty="0" err="1"/>
-              <a:t>Qset</a:t>
-            </a:r>
-            <a:r>
-              <a:rPr lang="en-US" dirty="0"/>
-              <a:t> 2</a:t>
+              <a:rPr lang="en-US" dirty="0"/>
+              <a:t>Clue 4</a:t>
             </a:r>
             <a:endParaRPr lang="en-GB" dirty="0"/>
           </a:p>
@@ -6285,7 +6293,7 @@
           <p:cNvPr id="3" name="Content Placeholder 2">
             <a:extLst>
               <a:ext uri="{FF2B5EF4-FFF2-40B4-BE49-F238E27FC236}">
-                <a16:creationId xmlns:a16="http://schemas.microsoft.com/office/drawing/2014/main" id="{25A13670-599A-4785-B5B9-C31E0BC5AA90}"/>
+                <a16:creationId xmlns:a16="http://schemas.microsoft.com/office/drawing/2014/main" id="{6C9A385F-52AC-4463-BDED-1E9E64DFC5C1}"/>
               </a:ext>
             </a:extLst>
           </p:cNvPr>
@@ -6303,29 +6311,8 @@
           <a:p>
             <a:r>
               <a:rPr lang="en-US" dirty="0"/>
-              <a:t>What is the synonym of beautiful? (bountiful, beauty, pretty, horrible)</a:t>
-            </a:r>
-          </a:p>
-          <a:p>
-            <a:r>
-              <a:rPr lang="en-US" dirty="0"/>
-              <a:t>What is the antonym of hideous? (ugly, plain, attractive, hide)</a:t>
-            </a:r>
-          </a:p>
-          <a:p>
-            <a:r>
-              <a:rPr lang="en-US" dirty="0"/>
-              <a:t>Which has the opposite meaning of ugly? (alluring, mad, insane, hideous)</a:t>
-            </a:r>
-          </a:p>
-          <a:p>
-            <a:r>
-              <a:rPr lang="en-US" dirty="0"/>
-              <a:t>Which of these doesn’t share the same meaning as attractive? (pretty, beautiful, alluring, plain)  </a:t>
-            </a:r>
-            <a:endParaRPr lang="en-GB" dirty="0"/>
-          </a:p>
-          <a:p>
+              <a:t>Good, fine, satisfactory, acceptable are the opposites of bad, poor, inferior, awful</a:t>
+            </a:r>
             <a:endParaRPr lang="en-GB" dirty="0"/>
           </a:p>
         </p:txBody>
@@ -6333,7 +6320,7 @@
     </p:spTree>
     <p:extLst>
       <p:ext uri="{BB962C8B-B14F-4D97-AF65-F5344CB8AC3E}">
-        <p14:creationId xmlns:p14="http://schemas.microsoft.com/office/powerpoint/2010/main" val="3219780353"/>
+        <p14:creationId xmlns:p14="http://schemas.microsoft.com/office/powerpoint/2010/main" val="3313335390"/>
       </p:ext>
     </p:extLst>
   </p:cSld>
@@ -6395,7 +6382,7 @@
             </a:r>
             <a:r>
               <a:rPr lang="en-US" dirty="0"/>
-              <a:t> 3</a:t>
+              <a:t> 1</a:t>
             </a:r>
             <a:endParaRPr lang="en-GB" dirty="0"/>
           </a:p>
@@ -6424,29 +6411,26 @@
           <a:p>
             <a:r>
               <a:rPr lang="en-US" dirty="0"/>
-              <a:t>What is the synonym of big? (enormous, little, tiny, bug)</a:t>
-            </a:r>
-          </a:p>
-          <a:p>
-            <a:r>
-              <a:rPr lang="en-US" dirty="0"/>
-              <a:t>What is the antonym of large? (huge, good, ugly, small)</a:t>
-            </a:r>
-          </a:p>
-          <a:p>
-            <a:r>
-              <a:rPr lang="en-US" dirty="0"/>
-              <a:t>Which has the opposite meaning of mini? (minty, big, bug, small)</a:t>
-            </a:r>
-          </a:p>
-          <a:p>
-            <a:r>
-              <a:rPr lang="en-US" dirty="0"/>
-              <a:t>Which of these doesn’t share the same meaning as enormous? (small, large, big, huge)</a:t>
-            </a:r>
-            <a:endParaRPr lang="en-GB" dirty="0"/>
-          </a:p>
-          <a:p>
+              <a:t>What is the synonym of happy? (high, merry, sad, up)</a:t>
+            </a:r>
+          </a:p>
+          <a:p>
+            <a:r>
+              <a:rPr lang="en-US" dirty="0"/>
+              <a:t>What is the antonym of sad? (dejected, down, joyful, fly)</a:t>
+            </a:r>
+          </a:p>
+          <a:p>
+            <a:r>
+              <a:rPr lang="en-US" dirty="0"/>
+              <a:t>Which has the opposite meaning of joyful? (death, cheerful, sad, indifferent)</a:t>
+            </a:r>
+          </a:p>
+          <a:p>
+            <a:r>
+              <a:rPr lang="en-US" dirty="0"/>
+              <a:t>Which of these doesn’t share the same meaning as merry? (happy, joyful, cheerful, smile)  </a:t>
+            </a:r>
             <a:endParaRPr lang="en-GB" dirty="0"/>
           </a:p>
         </p:txBody>
@@ -6454,7 +6438,7 @@
     </p:spTree>
     <p:extLst>
       <p:ext uri="{BB962C8B-B14F-4D97-AF65-F5344CB8AC3E}">
-        <p14:creationId xmlns:p14="http://schemas.microsoft.com/office/powerpoint/2010/main" val="3715262313"/>
+        <p14:creationId xmlns:p14="http://schemas.microsoft.com/office/powerpoint/2010/main" val="3143732294"/>
       </p:ext>
     </p:extLst>
   </p:cSld>
@@ -6516,7 +6500,7 @@
             </a:r>
             <a:r>
               <a:rPr lang="en-US" dirty="0"/>
-              <a:t> 4</a:t>
+              <a:t> 2</a:t>
             </a:r>
             <a:endParaRPr lang="en-GB" dirty="0"/>
           </a:p>
@@ -6545,26 +6529,29 @@
           <a:p>
             <a:r>
               <a:rPr lang="en-US" dirty="0"/>
-              <a:t>What is the synonym of fine? (find, good, gut, money)</a:t>
-            </a:r>
-          </a:p>
-          <a:p>
-            <a:r>
-              <a:rPr lang="en-US" dirty="0"/>
-              <a:t>What is the antonym of acceptable? (chair, satisfactory, bad, pool)</a:t>
-            </a:r>
-          </a:p>
-          <a:p>
-            <a:r>
-              <a:rPr lang="en-US" dirty="0"/>
-              <a:t>Which has the opposite meaning of awful? (satisfactory, lawful, empty, unacceptable)</a:t>
-            </a:r>
-          </a:p>
-          <a:p>
-            <a:r>
-              <a:rPr lang="en-US" dirty="0"/>
-              <a:t>Which of these doesn’t share the same meaning as bad? (poor, inferior, holy, awful)</a:t>
-            </a:r>
+              <a:t>What is the synonym of beautiful? (bountiful, beauty, pretty, horrible)</a:t>
+            </a:r>
+          </a:p>
+          <a:p>
+            <a:r>
+              <a:rPr lang="en-US" dirty="0"/>
+              <a:t>What is the antonym of hideous? (ugly, plain, attractive, hide)</a:t>
+            </a:r>
+          </a:p>
+          <a:p>
+            <a:r>
+              <a:rPr lang="en-US" dirty="0"/>
+              <a:t>Which has the opposite meaning of ugly? (alluring, mad, insane, hideous)</a:t>
+            </a:r>
+          </a:p>
+          <a:p>
+            <a:r>
+              <a:rPr lang="en-US" dirty="0"/>
+              <a:t>Which of these doesn’t share the same meaning as attractive? (pretty, beautiful, alluring, plain)  </a:t>
+            </a:r>
+            <a:endParaRPr lang="en-GB" dirty="0"/>
+          </a:p>
+          <a:p>
             <a:endParaRPr lang="en-GB" dirty="0"/>
           </a:p>
         </p:txBody>
@@ -6572,7 +6559,7 @@
     </p:spTree>
     <p:extLst>
       <p:ext uri="{BB962C8B-B14F-4D97-AF65-F5344CB8AC3E}">
-        <p14:creationId xmlns:p14="http://schemas.microsoft.com/office/powerpoint/2010/main" val="414501799"/>
+        <p14:creationId xmlns:p14="http://schemas.microsoft.com/office/powerpoint/2010/main" val="3219780353"/>
       </p:ext>
     </p:extLst>
   </p:cSld>
@@ -6634,7 +6621,7 @@
             </a:r>
             <a:r>
               <a:rPr lang="en-US" dirty="0"/>
-              <a:t> 5</a:t>
+              <a:t> 3</a:t>
             </a:r>
             <a:endParaRPr lang="en-GB" dirty="0"/>
           </a:p>
@@ -6663,32 +6650,27 @@
           <a:p>
             <a:r>
               <a:rPr lang="en-US" dirty="0"/>
-              <a:t>Which of these are synonyms? (Happy and Sad, Fine and Good, Enormous and Little, Pretty and Ugly)</a:t>
-            </a:r>
-          </a:p>
-          <a:p>
-            <a:r>
-              <a:rPr lang="en-US" dirty="0"/>
-              <a:t>Which of these are antonyms? (Joyful and Dejected, Acceptable and Fine, Small and Little, Pretty and Attractive)</a:t>
-            </a:r>
-          </a:p>
-          <a:p>
-            <a:r>
-              <a:rPr lang="en-US" dirty="0"/>
-              <a:t>Which of these share the same meaning? (Good and Bad, Fine and Good, Enormous and Little, Pretty and Ugly)</a:t>
-            </a:r>
-          </a:p>
-          <a:p>
-            <a:r>
-              <a:rPr lang="en-US" dirty="0"/>
-              <a:t>Which of these are opposites? (Happy and Merry, Fine and Good, Enormous and Little, Ugly and Hideous)</a:t>
-            </a:r>
-          </a:p>
-          <a:p>
-            <a:endParaRPr lang="en-US" dirty="0"/>
-          </a:p>
-          <a:p>
-            <a:endParaRPr lang="en-US" dirty="0"/>
+              <a:t>What is the synonym of big? (enormous, little, tiny, bug)</a:t>
+            </a:r>
+          </a:p>
+          <a:p>
+            <a:r>
+              <a:rPr lang="en-US" dirty="0"/>
+              <a:t>What is the antonym of large? (huge, good, ugly, small)</a:t>
+            </a:r>
+          </a:p>
+          <a:p>
+            <a:r>
+              <a:rPr lang="en-US" dirty="0"/>
+              <a:t>Which has the opposite meaning of mini? (minty, big, bug, small)</a:t>
+            </a:r>
+          </a:p>
+          <a:p>
+            <a:r>
+              <a:rPr lang="en-US" dirty="0"/>
+              <a:t>Which of these doesn’t share the same meaning as enormous? (small, large, big, huge)</a:t>
+            </a:r>
+            <a:endParaRPr lang="en-GB" dirty="0"/>
           </a:p>
           <a:p>
             <a:endParaRPr lang="en-GB" dirty="0"/>
@@ -6698,7 +6680,7 @@
     </p:spTree>
     <p:extLst>
       <p:ext uri="{BB962C8B-B14F-4D97-AF65-F5344CB8AC3E}">
-        <p14:creationId xmlns:p14="http://schemas.microsoft.com/office/powerpoint/2010/main" val="3817774115"/>
+        <p14:creationId xmlns:p14="http://schemas.microsoft.com/office/powerpoint/2010/main" val="3715262313"/>
       </p:ext>
     </p:extLst>
   </p:cSld>
@@ -6730,7 +6712,7 @@
           <p:cNvPr id="2" name="Title 1">
             <a:extLst>
               <a:ext uri="{FF2B5EF4-FFF2-40B4-BE49-F238E27FC236}">
-                <a16:creationId xmlns:a16="http://schemas.microsoft.com/office/drawing/2014/main" id="{D30CBE90-09A9-4041-B5E8-2BC77AD7A82A}"/>
+                <a16:creationId xmlns:a16="http://schemas.microsoft.com/office/drawing/2014/main" id="{F143DA0C-6127-4680-881B-473920F2D9BC}"/>
               </a:ext>
             </a:extLst>
           </p:cNvPr>
@@ -6747,8 +6729,20 @@
           <a:lstStyle/>
           <a:p>
             <a:r>
-              <a:rPr lang="en-US" dirty="0"/>
-              <a:t>Clue 5</a:t>
+              <a:rPr lang="en-US" dirty="0" err="1"/>
+              <a:t>Blesser</a:t>
+            </a:r>
+            <a:r>
+              <a:rPr lang="en-US" dirty="0"/>
+              <a:t> of Wisdom 1, </a:t>
+            </a:r>
+            <a:r>
+              <a:rPr lang="en-US" dirty="0" err="1"/>
+              <a:t>Qset</a:t>
+            </a:r>
+            <a:r>
+              <a:rPr lang="en-US" dirty="0"/>
+              <a:t> 4</a:t>
             </a:r>
             <a:endParaRPr lang="en-GB" dirty="0"/>
           </a:p>
@@ -6759,7 +6753,7 @@
           <p:cNvPr id="3" name="Content Placeholder 2">
             <a:extLst>
               <a:ext uri="{FF2B5EF4-FFF2-40B4-BE49-F238E27FC236}">
-                <a16:creationId xmlns:a16="http://schemas.microsoft.com/office/drawing/2014/main" id="{4FAA822C-451C-4451-A26C-5F027AF06711}"/>
+                <a16:creationId xmlns:a16="http://schemas.microsoft.com/office/drawing/2014/main" id="{25A13670-599A-4785-B5B9-C31E0BC5AA90}"/>
               </a:ext>
             </a:extLst>
           </p:cNvPr>
@@ -6777,7 +6771,25 @@
           <a:p>
             <a:r>
               <a:rPr lang="en-US" dirty="0"/>
-              <a:t>Literal means true to the meaning of the word, not indicating any metaphor or other meaning</a:t>
+              <a:t>What is the synonym of fine? (find, good, gut, money)</a:t>
+            </a:r>
+          </a:p>
+          <a:p>
+            <a:r>
+              <a:rPr lang="en-US" dirty="0"/>
+              <a:t>What is the antonym of acceptable? (chair, satisfactory, bad, pool)</a:t>
+            </a:r>
+          </a:p>
+          <a:p>
+            <a:r>
+              <a:rPr lang="en-US" dirty="0"/>
+              <a:t>Which has the opposite meaning of awful? (satisfactory, lawful, empty, unacceptable)</a:t>
+            </a:r>
+          </a:p>
+          <a:p>
+            <a:r>
+              <a:rPr lang="en-US" dirty="0"/>
+              <a:t>Which of these doesn’t share the same meaning as bad? (poor, inferior, holy, awful)</a:t>
             </a:r>
             <a:endParaRPr lang="en-GB" dirty="0"/>
           </a:p>
@@ -6786,7 +6798,7 @@
     </p:spTree>
     <p:extLst>
       <p:ext uri="{BB962C8B-B14F-4D97-AF65-F5344CB8AC3E}">
-        <p14:creationId xmlns:p14="http://schemas.microsoft.com/office/powerpoint/2010/main" val="2772948195"/>
+        <p14:creationId xmlns:p14="http://schemas.microsoft.com/office/powerpoint/2010/main" val="414501799"/>
       </p:ext>
     </p:extLst>
   </p:cSld>
@@ -6818,7 +6830,7 @@
           <p:cNvPr id="2" name="Title 1">
             <a:extLst>
               <a:ext uri="{FF2B5EF4-FFF2-40B4-BE49-F238E27FC236}">
-                <a16:creationId xmlns:a16="http://schemas.microsoft.com/office/drawing/2014/main" id="{6E95682F-4F2B-443A-943E-A366A37C035D}"/>
+                <a16:creationId xmlns:a16="http://schemas.microsoft.com/office/drawing/2014/main" id="{F143DA0C-6127-4680-881B-473920F2D9BC}"/>
               </a:ext>
             </a:extLst>
           </p:cNvPr>
@@ -6835,8 +6847,20 @@
           <a:lstStyle/>
           <a:p>
             <a:r>
-              <a:rPr lang="en-US" dirty="0"/>
-              <a:t>Clue 6</a:t>
+              <a:rPr lang="en-US" dirty="0" err="1"/>
+              <a:t>Blesser</a:t>
+            </a:r>
+            <a:r>
+              <a:rPr lang="en-US" dirty="0"/>
+              <a:t> of Wisdom 1, </a:t>
+            </a:r>
+            <a:r>
+              <a:rPr lang="en-US" dirty="0" err="1"/>
+              <a:t>Qset</a:t>
+            </a:r>
+            <a:r>
+              <a:rPr lang="en-US" dirty="0"/>
+              <a:t> 5</a:t>
             </a:r>
             <a:endParaRPr lang="en-GB" dirty="0"/>
           </a:p>
@@ -6847,7 +6871,7 @@
           <p:cNvPr id="3" name="Content Placeholder 2">
             <a:extLst>
               <a:ext uri="{FF2B5EF4-FFF2-40B4-BE49-F238E27FC236}">
-                <a16:creationId xmlns:a16="http://schemas.microsoft.com/office/drawing/2014/main" id="{48678939-0833-4050-8C63-88FCE1A5971F}"/>
+                <a16:creationId xmlns:a16="http://schemas.microsoft.com/office/drawing/2014/main" id="{25A13670-599A-4785-B5B9-C31E0BC5AA90}"/>
               </a:ext>
             </a:extLst>
           </p:cNvPr>
@@ -6865,8 +6889,34 @@
           <a:p>
             <a:r>
               <a:rPr lang="en-US" dirty="0"/>
-              <a:t>Obnoxious means extremely unpleasant</a:t>
-            </a:r>
+              <a:t>Which of these are synonyms? (Happy and Sad, Fine and Good, Enormous and Little, Pretty and Ugly)</a:t>
+            </a:r>
+          </a:p>
+          <a:p>
+            <a:r>
+              <a:rPr lang="en-US" dirty="0"/>
+              <a:t>Which of these are antonyms? (Joyful and Dejected, Acceptable and Fine, Small and Little, Pretty and Attractive)</a:t>
+            </a:r>
+          </a:p>
+          <a:p>
+            <a:r>
+              <a:rPr lang="en-US" dirty="0"/>
+              <a:t>Which of these share the same meaning? (Good and Bad, Fine and Good, Enormous and Little, Pretty and Ugly)</a:t>
+            </a:r>
+          </a:p>
+          <a:p>
+            <a:r>
+              <a:rPr lang="en-US" dirty="0"/>
+              <a:t>Which of these are opposites? (Happy and Merry, Fine and Good, Enormous and Little, Ugly and Hideous)</a:t>
+            </a:r>
+          </a:p>
+          <a:p>
+            <a:endParaRPr lang="en-US" dirty="0"/>
+          </a:p>
+          <a:p>
+            <a:endParaRPr lang="en-US" dirty="0"/>
+          </a:p>
+          <a:p>
             <a:endParaRPr lang="en-GB" dirty="0"/>
           </a:p>
         </p:txBody>
@@ -6874,7 +6924,7 @@
     </p:spTree>
     <p:extLst>
       <p:ext uri="{BB962C8B-B14F-4D97-AF65-F5344CB8AC3E}">
-        <p14:creationId xmlns:p14="http://schemas.microsoft.com/office/powerpoint/2010/main" val="3724290441"/>
+        <p14:creationId xmlns:p14="http://schemas.microsoft.com/office/powerpoint/2010/main" val="3817774115"/>
       </p:ext>
     </p:extLst>
   </p:cSld>
@@ -6906,7 +6956,7 @@
           <p:cNvPr id="2" name="Title 1">
             <a:extLst>
               <a:ext uri="{FF2B5EF4-FFF2-40B4-BE49-F238E27FC236}">
-                <a16:creationId xmlns:a16="http://schemas.microsoft.com/office/drawing/2014/main" id="{CB9D4B1A-0131-4F09-809C-EA1501C82D5A}"/>
+                <a16:creationId xmlns:a16="http://schemas.microsoft.com/office/drawing/2014/main" id="{D30CBE90-09A9-4041-B5E8-2BC77AD7A82A}"/>
               </a:ext>
             </a:extLst>
           </p:cNvPr>
@@ -6924,7 +6974,7 @@
           <a:p>
             <a:r>
               <a:rPr lang="en-US" dirty="0"/>
-              <a:t>Clue 7</a:t>
+              <a:t>Clue 5</a:t>
             </a:r>
             <a:endParaRPr lang="en-GB" dirty="0"/>
           </a:p>
@@ -6935,7 +6985,7 @@
           <p:cNvPr id="3" name="Content Placeholder 2">
             <a:extLst>
               <a:ext uri="{FF2B5EF4-FFF2-40B4-BE49-F238E27FC236}">
-                <a16:creationId xmlns:a16="http://schemas.microsoft.com/office/drawing/2014/main" id="{F4E149A4-A6D3-4B36-8CE7-4AA81AC43C2C}"/>
+                <a16:creationId xmlns:a16="http://schemas.microsoft.com/office/drawing/2014/main" id="{4FAA822C-451C-4451-A26C-5F027AF06711}"/>
               </a:ext>
             </a:extLst>
           </p:cNvPr>
@@ -6953,7 +7003,7 @@
           <a:p>
             <a:r>
               <a:rPr lang="en-US" dirty="0"/>
-              <a:t>Having or Showing a felling of patronizing superiority describes condescending pretty well. </a:t>
+              <a:t>Literal means true to the meaning of the word, not indicating any metaphor or other meaning</a:t>
             </a:r>
             <a:endParaRPr lang="en-GB" dirty="0"/>
           </a:p>
@@ -6962,7 +7012,7 @@
     </p:spTree>
     <p:extLst>
       <p:ext uri="{BB962C8B-B14F-4D97-AF65-F5344CB8AC3E}">
-        <p14:creationId xmlns:p14="http://schemas.microsoft.com/office/powerpoint/2010/main" val="3338806944"/>
+        <p14:creationId xmlns:p14="http://schemas.microsoft.com/office/powerpoint/2010/main" val="2772948195"/>
       </p:ext>
     </p:extLst>
   </p:cSld>
@@ -6994,7 +7044,7 @@
           <p:cNvPr id="2" name="Title 1">
             <a:extLst>
               <a:ext uri="{FF2B5EF4-FFF2-40B4-BE49-F238E27FC236}">
-                <a16:creationId xmlns:a16="http://schemas.microsoft.com/office/drawing/2014/main" id="{94858095-C41D-4830-82F4-CC462D2540CB}"/>
+                <a16:creationId xmlns:a16="http://schemas.microsoft.com/office/drawing/2014/main" id="{6E95682F-4F2B-443A-943E-A366A37C035D}"/>
               </a:ext>
             </a:extLst>
           </p:cNvPr>
@@ -7012,7 +7062,7 @@
           <a:p>
             <a:r>
               <a:rPr lang="en-US" dirty="0"/>
-              <a:t>Clue 8</a:t>
+              <a:t>Clue 6</a:t>
             </a:r>
             <a:endParaRPr lang="en-GB" dirty="0"/>
           </a:p>
@@ -7023,7 +7073,7 @@
           <p:cNvPr id="3" name="Content Placeholder 2">
             <a:extLst>
               <a:ext uri="{FF2B5EF4-FFF2-40B4-BE49-F238E27FC236}">
-                <a16:creationId xmlns:a16="http://schemas.microsoft.com/office/drawing/2014/main" id="{3703EE00-EAD2-4712-A748-37C917CB4112}"/>
+                <a16:creationId xmlns:a16="http://schemas.microsoft.com/office/drawing/2014/main" id="{48678939-0833-4050-8C63-88FCE1A5971F}"/>
               </a:ext>
             </a:extLst>
           </p:cNvPr>
@@ -7041,7 +7091,7 @@
           <a:p>
             <a:r>
               <a:rPr lang="en-US" dirty="0"/>
-              <a:t>An approximation is very close to the actual, despite not completely exact.</a:t>
+              <a:t>Obnoxious means extremely unpleasant</a:t>
             </a:r>
             <a:endParaRPr lang="en-GB" dirty="0"/>
           </a:p>
@@ -7050,7 +7100,7 @@
     </p:spTree>
     <p:extLst>
       <p:ext uri="{BB962C8B-B14F-4D97-AF65-F5344CB8AC3E}">
-        <p14:creationId xmlns:p14="http://schemas.microsoft.com/office/powerpoint/2010/main" val="3012113150"/>
+        <p14:creationId xmlns:p14="http://schemas.microsoft.com/office/powerpoint/2010/main" val="3724290441"/>
       </p:ext>
     </p:extLst>
   </p:cSld>
@@ -7082,7 +7132,7 @@
           <p:cNvPr id="2" name="Title 1">
             <a:extLst>
               <a:ext uri="{FF2B5EF4-FFF2-40B4-BE49-F238E27FC236}">
-                <a16:creationId xmlns:a16="http://schemas.microsoft.com/office/drawing/2014/main" id="{F143DA0C-6127-4680-881B-473920F2D9BC}"/>
+                <a16:creationId xmlns:a16="http://schemas.microsoft.com/office/drawing/2014/main" id="{CB9D4B1A-0131-4F09-809C-EA1501C82D5A}"/>
               </a:ext>
             </a:extLst>
           </p:cNvPr>
@@ -7099,20 +7149,8 @@
           <a:lstStyle/>
           <a:p>
             <a:r>
-              <a:rPr lang="en-US" dirty="0" err="1"/>
-              <a:t>Blesser</a:t>
-            </a:r>
-            <a:r>
-              <a:rPr lang="en-US" dirty="0"/>
-              <a:t> of Wisdom 2, </a:t>
-            </a:r>
-            <a:r>
-              <a:rPr lang="en-US" dirty="0" err="1"/>
-              <a:t>Qset</a:t>
-            </a:r>
-            <a:r>
-              <a:rPr lang="en-US" dirty="0"/>
-              <a:t> 1</a:t>
+              <a:rPr lang="en-US" dirty="0"/>
+              <a:t>Clue 7</a:t>
             </a:r>
             <a:endParaRPr lang="en-GB" dirty="0"/>
           </a:p>
@@ -7123,7 +7161,7 @@
           <p:cNvPr id="3" name="Content Placeholder 2">
             <a:extLst>
               <a:ext uri="{FF2B5EF4-FFF2-40B4-BE49-F238E27FC236}">
-                <a16:creationId xmlns:a16="http://schemas.microsoft.com/office/drawing/2014/main" id="{25A13670-599A-4785-B5B9-C31E0BC5AA90}"/>
+                <a16:creationId xmlns:a16="http://schemas.microsoft.com/office/drawing/2014/main" id="{F4E149A4-A6D3-4B36-8CE7-4AA81AC43C2C}"/>
               </a:ext>
             </a:extLst>
           </p:cNvPr>
@@ -7141,25 +7179,7 @@
           <a:p>
             <a:r>
               <a:rPr lang="en-US" dirty="0"/>
-              <a:t>____ means true to the meaning of the word. (Literal, Opinion, Writing, Decipherable)</a:t>
-            </a:r>
-          </a:p>
-          <a:p>
-            <a:r>
-              <a:rPr lang="en-US" dirty="0"/>
-              <a:t>____ means not using metaphor. (Opinion, Factual, Imagination, Obnoxious)</a:t>
-            </a:r>
-          </a:p>
-          <a:p>
-            <a:r>
-              <a:rPr lang="en-US" dirty="0"/>
-              <a:t>Not exaggerated describes ____. (Literal, Opinion, Imagination, Therefore)</a:t>
-            </a:r>
-          </a:p>
-          <a:p>
-            <a:r>
-              <a:rPr lang="en-US" dirty="0"/>
-              <a:t>True  to the meaning of the word is the meaning of ____. (Condescending, Imagination, Obnoxious, Literal)</a:t>
+              <a:t>Having or Showing a felling of patronizing superiority describes condescending pretty well. </a:t>
             </a:r>
             <a:endParaRPr lang="en-GB" dirty="0"/>
           </a:p>
@@ -7168,7 +7188,7 @@
     </p:spTree>
     <p:extLst>
       <p:ext uri="{BB962C8B-B14F-4D97-AF65-F5344CB8AC3E}">
-        <p14:creationId xmlns:p14="http://schemas.microsoft.com/office/powerpoint/2010/main" val="2466702452"/>
+        <p14:creationId xmlns:p14="http://schemas.microsoft.com/office/powerpoint/2010/main" val="3338806944"/>
       </p:ext>
     </p:extLst>
   </p:cSld>
@@ -7200,7 +7220,7 @@
           <p:cNvPr id="2" name="Title 1">
             <a:extLst>
               <a:ext uri="{FF2B5EF4-FFF2-40B4-BE49-F238E27FC236}">
-                <a16:creationId xmlns:a16="http://schemas.microsoft.com/office/drawing/2014/main" id="{F143DA0C-6127-4680-881B-473920F2D9BC}"/>
+                <a16:creationId xmlns:a16="http://schemas.microsoft.com/office/drawing/2014/main" id="{94858095-C41D-4830-82F4-CC462D2540CB}"/>
               </a:ext>
             </a:extLst>
           </p:cNvPr>
@@ -7217,20 +7237,8 @@
           <a:lstStyle/>
           <a:p>
             <a:r>
-              <a:rPr lang="en-US" dirty="0" err="1"/>
-              <a:t>Blesser</a:t>
-            </a:r>
-            <a:r>
-              <a:rPr lang="en-US" dirty="0"/>
-              <a:t> of Wisdom 2, </a:t>
-            </a:r>
-            <a:r>
-              <a:rPr lang="en-US" dirty="0" err="1"/>
-              <a:t>Qset</a:t>
-            </a:r>
-            <a:r>
-              <a:rPr lang="en-US" dirty="0"/>
-              <a:t> 2</a:t>
+              <a:rPr lang="en-US" dirty="0"/>
+              <a:t>Clue 8</a:t>
             </a:r>
             <a:endParaRPr lang="en-GB" dirty="0"/>
           </a:p>
@@ -7241,7 +7249,7 @@
           <p:cNvPr id="3" name="Content Placeholder 2">
             <a:extLst>
               <a:ext uri="{FF2B5EF4-FFF2-40B4-BE49-F238E27FC236}">
-                <a16:creationId xmlns:a16="http://schemas.microsoft.com/office/drawing/2014/main" id="{25A13670-599A-4785-B5B9-C31E0BC5AA90}"/>
+                <a16:creationId xmlns:a16="http://schemas.microsoft.com/office/drawing/2014/main" id="{3703EE00-EAD2-4712-A748-37C917CB4112}"/>
               </a:ext>
             </a:extLst>
           </p:cNvPr>
@@ -7259,25 +7267,7 @@
           <a:p>
             <a:r>
               <a:rPr lang="en-US" dirty="0"/>
-              <a:t>____ means extremely unpleasant. (Obnoxious, Joyful, Big, Small)</a:t>
-            </a:r>
-          </a:p>
-          <a:p>
-            <a:r>
-              <a:rPr lang="en-US" dirty="0"/>
-              <a:t>Extremely unpleasant is replaceable by ____. (Condescending, Literal, Obnoxious, Adjacent)</a:t>
-            </a:r>
-          </a:p>
-          <a:p>
-            <a:r>
-              <a:rPr lang="en-US" dirty="0"/>
-              <a:t>He is obnoxious. It means that person is extremely ____. (Pleasant, Unpleasant, Good, Happy)</a:t>
-            </a:r>
-          </a:p>
-          <a:p>
-            <a:r>
-              <a:rPr lang="en-US" dirty="0"/>
-              <a:t>____ has the opposite meaning of extremely pleasant. (Obnoxious, Nice, Fine, Literal)</a:t>
+              <a:t>An approximation is very close to the actual, despite not completely exact.</a:t>
             </a:r>
             <a:endParaRPr lang="en-GB" dirty="0"/>
           </a:p>
@@ -7286,7 +7276,7 @@
     </p:spTree>
     <p:extLst>
       <p:ext uri="{BB962C8B-B14F-4D97-AF65-F5344CB8AC3E}">
-        <p14:creationId xmlns:p14="http://schemas.microsoft.com/office/powerpoint/2010/main" val="1442959752"/>
+        <p14:creationId xmlns:p14="http://schemas.microsoft.com/office/powerpoint/2010/main" val="3012113150"/>
       </p:ext>
     </p:extLst>
   </p:cSld>
@@ -8787,7 +8777,7 @@
             </a:r>
             <a:r>
               <a:rPr lang="en-US" dirty="0"/>
-              <a:t> 3</a:t>
+              <a:t> 1</a:t>
             </a:r>
             <a:endParaRPr lang="en-GB" dirty="0"/>
           </a:p>
@@ -8816,29 +8806,26 @@
           <a:p>
             <a:r>
               <a:rPr lang="en-US" dirty="0"/>
-              <a:t>Condescending is having a feeling of patronizing ____. (Superiority, Inferiority, Superficial, Obnoxious)</a:t>
-            </a:r>
-          </a:p>
-          <a:p>
-            <a:r>
-              <a:rPr lang="en-US" dirty="0"/>
-              <a:t>Having or showing a feeling of patronizing superiority is the meaning of ____. (Obnoxious, Literal, Happy, Condescending)</a:t>
-            </a:r>
-          </a:p>
-          <a:p>
-            <a:r>
-              <a:rPr lang="en-US" dirty="0"/>
-              <a:t>To simplify it, having a feeling of patronizing superiority can be rewritten as ____. (Approximate, Condescending, Inferior, Literal)</a:t>
-            </a:r>
-          </a:p>
-          <a:p>
-            <a:r>
-              <a:rPr lang="en-US" dirty="0"/>
-              <a:t>My boss shows a feeling of patronizing superiority. It means that he is ____. (Condescending, Obnoxious, Enormous, Adolescence)</a:t>
-            </a:r>
-            <a:endParaRPr lang="en-GB" dirty="0"/>
-          </a:p>
-          <a:p>
+              <a:t>____ means true to the meaning of the word. (Literal, Opinion, Writing, Decipherable)</a:t>
+            </a:r>
+          </a:p>
+          <a:p>
+            <a:r>
+              <a:rPr lang="en-US" dirty="0"/>
+              <a:t>____ means not using metaphor. (Opinion, Factual, Imagination, Obnoxious)</a:t>
+            </a:r>
+          </a:p>
+          <a:p>
+            <a:r>
+              <a:rPr lang="en-US" dirty="0"/>
+              <a:t>Not exaggerated describes ____. (Literal, Opinion, Imagination, Therefore)</a:t>
+            </a:r>
+          </a:p>
+          <a:p>
+            <a:r>
+              <a:rPr lang="en-US" dirty="0"/>
+              <a:t>True  to the meaning of the word is the meaning of ____. (Condescending, Imagination, Obnoxious, Literal)</a:t>
+            </a:r>
             <a:endParaRPr lang="en-GB" dirty="0"/>
           </a:p>
         </p:txBody>
@@ -8846,7 +8833,7 @@
     </p:spTree>
     <p:extLst>
       <p:ext uri="{BB962C8B-B14F-4D97-AF65-F5344CB8AC3E}">
-        <p14:creationId xmlns:p14="http://schemas.microsoft.com/office/powerpoint/2010/main" val="2223113649"/>
+        <p14:creationId xmlns:p14="http://schemas.microsoft.com/office/powerpoint/2010/main" val="2466702452"/>
       </p:ext>
     </p:extLst>
   </p:cSld>
@@ -8908,7 +8895,7 @@
             </a:r>
             <a:r>
               <a:rPr lang="en-US" dirty="0"/>
-              <a:t> 4</a:t>
+              <a:t> 2</a:t>
             </a:r>
             <a:endParaRPr lang="en-GB" dirty="0"/>
           </a:p>
@@ -8932,32 +8919,30 @@
         </p:nvSpPr>
         <p:spPr/>
         <p:txBody>
-          <a:bodyPr>
-            <a:normAutofit/>
-          </a:bodyPr>
-          <a:lstStyle/>
-          <a:p>
-            <a:r>
-              <a:rPr lang="en-US" dirty="0"/>
-              <a:t>Close to the actual thing yet not the exact same thing is an ____ of the thing. (Approximation, Adolescent, Inferior, Unhappy).</a:t>
-            </a:r>
-          </a:p>
-          <a:p>
-            <a:r>
-              <a:rPr lang="en-US" dirty="0"/>
-              <a:t>We cannot get the exact data, so we use an ____ for the calculation. (Approximation, Obnoxious, Adolescent, Literal)</a:t>
-            </a:r>
-          </a:p>
-          <a:p>
-            <a:r>
-              <a:rPr lang="en-US" dirty="0"/>
-              <a:t>Close to the actual, yet not completely exact is rewritable as an ____. (Adoration, Adolescent, Approximation, Unification)</a:t>
-            </a:r>
-          </a:p>
-          <a:p>
-            <a:r>
-              <a:rPr lang="en-US" dirty="0"/>
-              <a:t>An approximation is a good approach to process something that we can’t get the complete ___ of due to limitations. (Exact, Patronize,  Adolescent, Obnoxious)</a:t>
+          <a:bodyPr/>
+          <a:lstStyle/>
+          <a:p>
+            <a:r>
+              <a:rPr lang="en-US" dirty="0"/>
+              <a:t>____ means extremely unpleasant. (Obnoxious, Joyful, Big, Small)</a:t>
+            </a:r>
+          </a:p>
+          <a:p>
+            <a:r>
+              <a:rPr lang="en-US" dirty="0"/>
+              <a:t>Extremely unpleasant is replaceable by ____. (Condescending, Literal, Obnoxious, Adjacent)</a:t>
+            </a:r>
+          </a:p>
+          <a:p>
+            <a:r>
+              <a:rPr lang="en-US" dirty="0"/>
+              <a:t>He is obnoxious. It means that person is extremely ____. (Pleasant, Unpleasant, Good, Happy)</a:t>
+            </a:r>
+          </a:p>
+          <a:p>
+            <a:r>
+              <a:rPr lang="en-US" dirty="0"/>
+              <a:t>____ has the opposite meaning of extremely pleasant. (Obnoxious, Nice, Fine, Literal)</a:t>
             </a:r>
             <a:endParaRPr lang="en-GB" dirty="0"/>
           </a:p>
@@ -8966,7 +8951,7 @@
     </p:spTree>
     <p:extLst>
       <p:ext uri="{BB962C8B-B14F-4D97-AF65-F5344CB8AC3E}">
-        <p14:creationId xmlns:p14="http://schemas.microsoft.com/office/powerpoint/2010/main" val="3485095156"/>
+        <p14:creationId xmlns:p14="http://schemas.microsoft.com/office/powerpoint/2010/main" val="1442959752"/>
       </p:ext>
     </p:extLst>
   </p:cSld>
@@ -9028,6 +9013,247 @@
             </a:r>
             <a:r>
               <a:rPr lang="en-US" dirty="0"/>
+              <a:t> 3</a:t>
+            </a:r>
+            <a:endParaRPr lang="en-GB" dirty="0"/>
+          </a:p>
+        </p:txBody>
+      </p:sp>
+      <p:sp>
+        <p:nvSpPr>
+          <p:cNvPr id="3" name="Content Placeholder 2">
+            <a:extLst>
+              <a:ext uri="{FF2B5EF4-FFF2-40B4-BE49-F238E27FC236}">
+                <a16:creationId xmlns:a16="http://schemas.microsoft.com/office/drawing/2014/main" id="{25A13670-599A-4785-B5B9-C31E0BC5AA90}"/>
+              </a:ext>
+            </a:extLst>
+          </p:cNvPr>
+          <p:cNvSpPr>
+            <a:spLocks noGrp="1"/>
+          </p:cNvSpPr>
+          <p:nvPr>
+            <p:ph idx="1"/>
+          </p:nvPr>
+        </p:nvSpPr>
+        <p:spPr/>
+        <p:txBody>
+          <a:bodyPr/>
+          <a:lstStyle/>
+          <a:p>
+            <a:r>
+              <a:rPr lang="en-US" dirty="0"/>
+              <a:t>Condescending is having a feeling of patronizing ____. (Superiority, Inferiority, Superficial, Obnoxious)</a:t>
+            </a:r>
+          </a:p>
+          <a:p>
+            <a:r>
+              <a:rPr lang="en-US" dirty="0"/>
+              <a:t>Having or showing a feeling of patronizing superiority is the meaning of ____. (Obnoxious, Literal, Happy, Condescending)</a:t>
+            </a:r>
+          </a:p>
+          <a:p>
+            <a:r>
+              <a:rPr lang="en-US" dirty="0"/>
+              <a:t>To simplify it, having a feeling of patronizing superiority can be rewritten as ____. (Approximate, Condescending, Inferior, Literal)</a:t>
+            </a:r>
+          </a:p>
+          <a:p>
+            <a:r>
+              <a:rPr lang="en-US" dirty="0"/>
+              <a:t>My boss shows a feeling of patronizing superiority. It means that he is ____. (Condescending, Obnoxious, Enormous, Adolescence)</a:t>
+            </a:r>
+            <a:endParaRPr lang="en-GB" dirty="0"/>
+          </a:p>
+          <a:p>
+            <a:endParaRPr lang="en-GB" dirty="0"/>
+          </a:p>
+        </p:txBody>
+      </p:sp>
+    </p:spTree>
+    <p:extLst>
+      <p:ext uri="{BB962C8B-B14F-4D97-AF65-F5344CB8AC3E}">
+        <p14:creationId xmlns:p14="http://schemas.microsoft.com/office/powerpoint/2010/main" val="2223113649"/>
+      </p:ext>
+    </p:extLst>
+  </p:cSld>
+  <p:clrMapOvr>
+    <a:masterClrMapping/>
+  </p:clrMapOvr>
+</p:sld>
+</file>
+
+<file path=ppt/slides/slide43.xml><?xml version="1.0" encoding="utf-8"?>
+<p:sld xmlns:a="http://schemas.openxmlformats.org/drawingml/2006/main" xmlns:r="http://schemas.openxmlformats.org/officeDocument/2006/relationships" xmlns:p="http://schemas.openxmlformats.org/presentationml/2006/main">
+  <p:cSld>
+    <p:spTree>
+      <p:nvGrpSpPr>
+        <p:cNvPr id="1" name=""/>
+        <p:cNvGrpSpPr/>
+        <p:nvPr/>
+      </p:nvGrpSpPr>
+      <p:grpSpPr>
+        <a:xfrm>
+          <a:off x="0" y="0"/>
+          <a:ext cx="0" cy="0"/>
+          <a:chOff x="0" y="0"/>
+          <a:chExt cx="0" cy="0"/>
+        </a:xfrm>
+      </p:grpSpPr>
+      <p:sp>
+        <p:nvSpPr>
+          <p:cNvPr id="2" name="Title 1">
+            <a:extLst>
+              <a:ext uri="{FF2B5EF4-FFF2-40B4-BE49-F238E27FC236}">
+                <a16:creationId xmlns:a16="http://schemas.microsoft.com/office/drawing/2014/main" id="{F143DA0C-6127-4680-881B-473920F2D9BC}"/>
+              </a:ext>
+            </a:extLst>
+          </p:cNvPr>
+          <p:cNvSpPr>
+            <a:spLocks noGrp="1"/>
+          </p:cNvSpPr>
+          <p:nvPr>
+            <p:ph type="title"/>
+          </p:nvPr>
+        </p:nvSpPr>
+        <p:spPr/>
+        <p:txBody>
+          <a:bodyPr/>
+          <a:lstStyle/>
+          <a:p>
+            <a:r>
+              <a:rPr lang="en-US" dirty="0" err="1"/>
+              <a:t>Blesser</a:t>
+            </a:r>
+            <a:r>
+              <a:rPr lang="en-US" dirty="0"/>
+              <a:t> of Wisdom 2, </a:t>
+            </a:r>
+            <a:r>
+              <a:rPr lang="en-US" dirty="0" err="1"/>
+              <a:t>Qset</a:t>
+            </a:r>
+            <a:r>
+              <a:rPr lang="en-US" dirty="0"/>
+              <a:t> 4</a:t>
+            </a:r>
+            <a:endParaRPr lang="en-GB" dirty="0"/>
+          </a:p>
+        </p:txBody>
+      </p:sp>
+      <p:sp>
+        <p:nvSpPr>
+          <p:cNvPr id="3" name="Content Placeholder 2">
+            <a:extLst>
+              <a:ext uri="{FF2B5EF4-FFF2-40B4-BE49-F238E27FC236}">
+                <a16:creationId xmlns:a16="http://schemas.microsoft.com/office/drawing/2014/main" id="{25A13670-599A-4785-B5B9-C31E0BC5AA90}"/>
+              </a:ext>
+            </a:extLst>
+          </p:cNvPr>
+          <p:cNvSpPr>
+            <a:spLocks noGrp="1"/>
+          </p:cNvSpPr>
+          <p:nvPr>
+            <p:ph idx="1"/>
+          </p:nvPr>
+        </p:nvSpPr>
+        <p:spPr/>
+        <p:txBody>
+          <a:bodyPr>
+            <a:normAutofit/>
+          </a:bodyPr>
+          <a:lstStyle/>
+          <a:p>
+            <a:r>
+              <a:rPr lang="en-US" dirty="0"/>
+              <a:t>Close to the actual thing yet not the exact same thing is an ____ of the thing. (Approximation, Adolescent, Inferior, Unhappy).</a:t>
+            </a:r>
+          </a:p>
+          <a:p>
+            <a:r>
+              <a:rPr lang="en-US" dirty="0"/>
+              <a:t>We cannot get the exact data, so we use an ____ for the calculation. (Approximation, Obnoxious, Adolescent, Literal)</a:t>
+            </a:r>
+          </a:p>
+          <a:p>
+            <a:r>
+              <a:rPr lang="en-US" dirty="0"/>
+              <a:t>Close to the actual, yet not completely exact is rewritable as an ____. (Adoration, Adolescent, Approximation, Unification)</a:t>
+            </a:r>
+          </a:p>
+          <a:p>
+            <a:r>
+              <a:rPr lang="en-US" dirty="0"/>
+              <a:t>An approximation is a good approach to process something that we can’t get the complete ___ of due to limitations. (Exact, Patronize,  Adolescent, Obnoxious)</a:t>
+            </a:r>
+            <a:endParaRPr lang="en-GB" dirty="0"/>
+          </a:p>
+        </p:txBody>
+      </p:sp>
+    </p:spTree>
+    <p:extLst>
+      <p:ext uri="{BB962C8B-B14F-4D97-AF65-F5344CB8AC3E}">
+        <p14:creationId xmlns:p14="http://schemas.microsoft.com/office/powerpoint/2010/main" val="3485095156"/>
+      </p:ext>
+    </p:extLst>
+  </p:cSld>
+  <p:clrMapOvr>
+    <a:masterClrMapping/>
+  </p:clrMapOvr>
+</p:sld>
+</file>
+
+<file path=ppt/slides/slide44.xml><?xml version="1.0" encoding="utf-8"?>
+<p:sld xmlns:a="http://schemas.openxmlformats.org/drawingml/2006/main" xmlns:r="http://schemas.openxmlformats.org/officeDocument/2006/relationships" xmlns:p="http://schemas.openxmlformats.org/presentationml/2006/main">
+  <p:cSld>
+    <p:spTree>
+      <p:nvGrpSpPr>
+        <p:cNvPr id="1" name=""/>
+        <p:cNvGrpSpPr/>
+        <p:nvPr/>
+      </p:nvGrpSpPr>
+      <p:grpSpPr>
+        <a:xfrm>
+          <a:off x="0" y="0"/>
+          <a:ext cx="0" cy="0"/>
+          <a:chOff x="0" y="0"/>
+          <a:chExt cx="0" cy="0"/>
+        </a:xfrm>
+      </p:grpSpPr>
+      <p:sp>
+        <p:nvSpPr>
+          <p:cNvPr id="2" name="Title 1">
+            <a:extLst>
+              <a:ext uri="{FF2B5EF4-FFF2-40B4-BE49-F238E27FC236}">
+                <a16:creationId xmlns:a16="http://schemas.microsoft.com/office/drawing/2014/main" id="{F143DA0C-6127-4680-881B-473920F2D9BC}"/>
+              </a:ext>
+            </a:extLst>
+          </p:cNvPr>
+          <p:cNvSpPr>
+            <a:spLocks noGrp="1"/>
+          </p:cNvSpPr>
+          <p:nvPr>
+            <p:ph type="title"/>
+          </p:nvPr>
+        </p:nvSpPr>
+        <p:spPr/>
+        <p:txBody>
+          <a:bodyPr/>
+          <a:lstStyle/>
+          <a:p>
+            <a:r>
+              <a:rPr lang="en-US" dirty="0" err="1"/>
+              <a:t>Blesser</a:t>
+            </a:r>
+            <a:r>
+              <a:rPr lang="en-US" dirty="0"/>
+              <a:t> of Wisdom 2, </a:t>
+            </a:r>
+            <a:r>
+              <a:rPr lang="en-US" dirty="0" err="1"/>
+              <a:t>Qset</a:t>
+            </a:r>
+            <a:r>
+              <a:rPr lang="en-US" dirty="0"/>
               <a:t> 5</a:t>
             </a:r>
             <a:endParaRPr lang="en-GB" dirty="0"/>
@@ -9096,7 +9322,7 @@
 </p:sld>
 </file>
 
-<file path=ppt/slides/slide43.xml><?xml version="1.0" encoding="utf-8"?>
+<file path=ppt/slides/slide45.xml><?xml version="1.0" encoding="utf-8"?>
 <p:sld xmlns:a="http://schemas.openxmlformats.org/drawingml/2006/main" xmlns:r="http://schemas.openxmlformats.org/officeDocument/2006/relationships" xmlns:p="http://schemas.openxmlformats.org/presentationml/2006/main">
   <p:cSld>
     <p:spTree>

</xml_diff>

<commit_message>
shop, debug event, rebal
</commit_message>
<xml_diff>
--- a/Konsep.pptx
+++ b/Konsep.pptx
@@ -5121,15 +5121,7 @@
           <a:p>
             <a:r>
               <a:rPr lang="en-US" dirty="0"/>
-              <a:t>This is ___ pencil</a:t>
-            </a:r>
-            <a:r>
-              <a:rPr lang="en-US"/>
-              <a:t>. (</a:t>
-            </a:r>
-            <a:r>
-              <a:rPr lang="en-US" dirty="0"/>
-              <a:t>you, your, you’re, are)</a:t>
+              <a:t>This is ___ pencil. (you, your, you’re, are)</a:t>
             </a:r>
           </a:p>
           <a:p>
@@ -9283,7 +9275,7 @@
           <a:p>
             <a:r>
               <a:rPr lang="en-US" dirty="0"/>
-              <a:t>He is not pretty and not ____. (Obnoxious, Approximation, Book, But)</a:t>
+              <a:t>He is not pretty but not ____. (Obnoxious, Approximation, Book, But)</a:t>
             </a:r>
           </a:p>
           <a:p>
@@ -9301,7 +9293,7 @@
           <a:p>
             <a:r>
               <a:rPr lang="en-US" dirty="0"/>
-              <a:t>I don’t like her. She is pretty but ____. (Obnoxious, Condescending, Approximation, Attractive)</a:t>
+              <a:t>I don’t like her. She is pretty but ____. (Ugly, Condescending, Approximation, Attractive)</a:t>
             </a:r>
           </a:p>
           <a:p>

</xml_diff>